<commit_message>
--Ali-- 17 Oct 2016 --Ali--
</commit_message>
<xml_diff>
--- a/documents/Presentation.pptx
+++ b/documents/Presentation.pptx
@@ -6,30 +6,29 @@
   </p:sldMasterIdLst>
   <p:sldIdLst>
     <p:sldId id="256" r:id="rId2"/>
-    <p:sldId id="293" r:id="rId3"/>
-    <p:sldId id="272" r:id="rId4"/>
-    <p:sldId id="273" r:id="rId5"/>
-    <p:sldId id="285" r:id="rId6"/>
-    <p:sldId id="286" r:id="rId7"/>
-    <p:sldId id="294" r:id="rId8"/>
-    <p:sldId id="295" r:id="rId9"/>
-    <p:sldId id="298" r:id="rId10"/>
-    <p:sldId id="303" r:id="rId11"/>
-    <p:sldId id="299" r:id="rId12"/>
-    <p:sldId id="296" r:id="rId13"/>
-    <p:sldId id="300" r:id="rId14"/>
-    <p:sldId id="301" r:id="rId15"/>
-    <p:sldId id="297" r:id="rId16"/>
-    <p:sldId id="304" r:id="rId17"/>
-    <p:sldId id="305" r:id="rId18"/>
-    <p:sldId id="306" r:id="rId19"/>
-    <p:sldId id="307" r:id="rId20"/>
-    <p:sldId id="308" r:id="rId21"/>
-    <p:sldId id="309" r:id="rId22"/>
-    <p:sldId id="310" r:id="rId23"/>
-    <p:sldId id="311" r:id="rId24"/>
-    <p:sldId id="302" r:id="rId25"/>
-    <p:sldId id="269" r:id="rId26"/>
+    <p:sldId id="272" r:id="rId3"/>
+    <p:sldId id="273" r:id="rId4"/>
+    <p:sldId id="285" r:id="rId5"/>
+    <p:sldId id="286" r:id="rId6"/>
+    <p:sldId id="294" r:id="rId7"/>
+    <p:sldId id="295" r:id="rId8"/>
+    <p:sldId id="298" r:id="rId9"/>
+    <p:sldId id="303" r:id="rId10"/>
+    <p:sldId id="299" r:id="rId11"/>
+    <p:sldId id="296" r:id="rId12"/>
+    <p:sldId id="300" r:id="rId13"/>
+    <p:sldId id="301" r:id="rId14"/>
+    <p:sldId id="297" r:id="rId15"/>
+    <p:sldId id="304" r:id="rId16"/>
+    <p:sldId id="305" r:id="rId17"/>
+    <p:sldId id="306" r:id="rId18"/>
+    <p:sldId id="307" r:id="rId19"/>
+    <p:sldId id="308" r:id="rId20"/>
+    <p:sldId id="309" r:id="rId21"/>
+    <p:sldId id="310" r:id="rId22"/>
+    <p:sldId id="311" r:id="rId23"/>
+    <p:sldId id="302" r:id="rId24"/>
+    <p:sldId id="269" r:id="rId25"/>
   </p:sldIdLst>
   <p:sldSz cx="12192000" cy="6858000"/>
   <p:notesSz cx="6858000" cy="9144000"/>
@@ -130,7 +129,7 @@
   </p:defaultTextStyle>
   <p:extLst>
     <p:ext uri="{EFAFB233-063F-42B5-8137-9DF3F51BA10A}">
-      <p15:sldGuideLst xmlns:p15="http://schemas.microsoft.com/office/powerpoint/2012/main" xmlns="">
+      <p15:sldGuideLst xmlns:p15="http://schemas.microsoft.com/office/powerpoint/2012/main">
         <p15:guide id="1" orient="horz" pos="2160">
           <p15:clr>
             <a:srgbClr val="A4A3A4"/>
@@ -336,7 +335,7 @@
             <a:fld id="{B61BEF0D-F0BB-DE4B-95CE-6DB70DBA9567}" type="datetimeFigureOut">
               <a:rPr lang="en-US" dirty="0"/>
               <a:pPr/>
-              <a:t>10/16/2016</a:t>
+              <a:t>10/17/2016</a:t>
             </a:fld>
             <a:endParaRPr lang="en-US" dirty="0"/>
           </a:p>
@@ -671,7 +670,7 @@
             <a:fld id="{B61BEF0D-F0BB-DE4B-95CE-6DB70DBA9567}" type="datetimeFigureOut">
               <a:rPr lang="en-US" dirty="0"/>
               <a:pPr/>
-              <a:t>10/16/2016</a:t>
+              <a:t>10/17/2016</a:t>
             </a:fld>
             <a:endParaRPr lang="en-US" dirty="0"/>
           </a:p>
@@ -1069,7 +1068,7 @@
             <a:fld id="{B61BEF0D-F0BB-DE4B-95CE-6DB70DBA9567}" type="datetimeFigureOut">
               <a:rPr lang="en-US" dirty="0"/>
               <a:pPr/>
-              <a:t>10/16/2016</a:t>
+              <a:t>10/17/2016</a:t>
             </a:fld>
             <a:endParaRPr lang="en-US" dirty="0"/>
           </a:p>
@@ -1402,7 +1401,7 @@
             <a:fld id="{B61BEF0D-F0BB-DE4B-95CE-6DB70DBA9567}" type="datetimeFigureOut">
               <a:rPr lang="en-US" dirty="0"/>
               <a:pPr/>
-              <a:t>10/16/2016</a:t>
+              <a:t>10/17/2016</a:t>
             </a:fld>
             <a:endParaRPr lang="en-US" dirty="0"/>
           </a:p>
@@ -1719,7 +1718,7 @@
             <a:fld id="{B61BEF0D-F0BB-DE4B-95CE-6DB70DBA9567}" type="datetimeFigureOut">
               <a:rPr lang="en-US" dirty="0"/>
               <a:pPr/>
-              <a:t>10/16/2016</a:t>
+              <a:t>10/17/2016</a:t>
             </a:fld>
             <a:endParaRPr lang="en-US" dirty="0"/>
           </a:p>
@@ -2112,7 +2111,7 @@
             <a:fld id="{B61BEF0D-F0BB-DE4B-95CE-6DB70DBA9567}" type="datetimeFigureOut">
               <a:rPr lang="en-US" dirty="0"/>
               <a:pPr/>
-              <a:t>10/16/2016</a:t>
+              <a:t>10/17/2016</a:t>
             </a:fld>
             <a:endParaRPr lang="en-US" dirty="0"/>
           </a:p>
@@ -2366,7 +2365,7 @@
             <a:fld id="{B61BEF0D-F0BB-DE4B-95CE-6DB70DBA9567}" type="datetimeFigureOut">
               <a:rPr lang="en-US" dirty="0"/>
               <a:pPr/>
-              <a:t>10/16/2016</a:t>
+              <a:t>10/17/2016</a:t>
             </a:fld>
             <a:endParaRPr lang="en-US" dirty="0"/>
           </a:p>
@@ -2625,7 +2624,7 @@
             <a:fld id="{B61BEF0D-F0BB-DE4B-95CE-6DB70DBA9567}" type="datetimeFigureOut">
               <a:rPr lang="en-US" dirty="0"/>
               <a:pPr/>
-              <a:t>10/16/2016</a:t>
+              <a:t>10/17/2016</a:t>
             </a:fld>
             <a:endParaRPr lang="en-US" dirty="0"/>
           </a:p>
@@ -2884,7 +2883,7 @@
             <a:fld id="{B61BEF0D-F0BB-DE4B-95CE-6DB70DBA9567}" type="datetimeFigureOut">
               <a:rPr lang="en-US" dirty="0"/>
               <a:pPr/>
-              <a:t>10/16/2016</a:t>
+              <a:t>10/17/2016</a:t>
             </a:fld>
             <a:endParaRPr lang="en-US" dirty="0"/>
           </a:p>
@@ -3210,7 +3209,7 @@
             <a:fld id="{B61BEF0D-F0BB-DE4B-95CE-6DB70DBA9567}" type="datetimeFigureOut">
               <a:rPr lang="en-US" dirty="0"/>
               <a:pPr/>
-              <a:t>10/16/2016</a:t>
+              <a:t>10/17/2016</a:t>
             </a:fld>
             <a:endParaRPr lang="en-US" dirty="0"/>
           </a:p>
@@ -3530,7 +3529,7 @@
             <a:fld id="{B61BEF0D-F0BB-DE4B-95CE-6DB70DBA9567}" type="datetimeFigureOut">
               <a:rPr lang="en-US" dirty="0"/>
               <a:pPr/>
-              <a:t>10/16/2016</a:t>
+              <a:t>10/17/2016</a:t>
             </a:fld>
             <a:endParaRPr lang="en-US" dirty="0"/>
           </a:p>
@@ -3984,7 +3983,7 @@
             <a:fld id="{B61BEF0D-F0BB-DE4B-95CE-6DB70DBA9567}" type="datetimeFigureOut">
               <a:rPr lang="en-US" dirty="0"/>
               <a:pPr/>
-              <a:t>10/16/2016</a:t>
+              <a:t>10/17/2016</a:t>
             </a:fld>
             <a:endParaRPr lang="en-US" dirty="0"/>
           </a:p>
@@ -4186,7 +4185,7 @@
             <a:fld id="{B61BEF0D-F0BB-DE4B-95CE-6DB70DBA9567}" type="datetimeFigureOut">
               <a:rPr lang="en-US" dirty="0"/>
               <a:pPr/>
-              <a:t>10/16/2016</a:t>
+              <a:t>10/17/2016</a:t>
             </a:fld>
             <a:endParaRPr lang="en-US" dirty="0"/>
           </a:p>
@@ -4360,7 +4359,7 @@
             <a:fld id="{B61BEF0D-F0BB-DE4B-95CE-6DB70DBA9567}" type="datetimeFigureOut">
               <a:rPr lang="en-US" dirty="0"/>
               <a:pPr/>
-              <a:t>10/16/2016</a:t>
+              <a:t>10/17/2016</a:t>
             </a:fld>
             <a:endParaRPr lang="en-US" dirty="0"/>
           </a:p>
@@ -4690,7 +4689,7 @@
             <a:fld id="{B61BEF0D-F0BB-DE4B-95CE-6DB70DBA9567}" type="datetimeFigureOut">
               <a:rPr lang="en-US" dirty="0"/>
               <a:pPr/>
-              <a:t>10/16/2016</a:t>
+              <a:t>10/17/2016</a:t>
             </a:fld>
             <a:endParaRPr lang="en-US" dirty="0"/>
           </a:p>
@@ -5032,7 +5031,7 @@
             <a:fld id="{B61BEF0D-F0BB-DE4B-95CE-6DB70DBA9567}" type="datetimeFigureOut">
               <a:rPr lang="en-US" dirty="0"/>
               <a:pPr/>
-              <a:t>10/16/2016</a:t>
+              <a:t>10/17/2016</a:t>
             </a:fld>
             <a:endParaRPr lang="en-US" dirty="0"/>
           </a:p>
@@ -7146,7 +7145,7 @@
             <a:fld id="{B61BEF0D-F0BB-DE4B-95CE-6DB70DBA9567}" type="datetimeFigureOut">
               <a:rPr lang="en-US" dirty="0"/>
               <a:pPr/>
-              <a:t>10/16/2016</a:t>
+              <a:t>10/17/2016</a:t>
             </a:fld>
             <a:endParaRPr lang="en-US" dirty="0"/>
           </a:p>
@@ -7750,6 +7749,13 @@
   <p:clrMapOvr>
     <a:masterClrMapping/>
   </p:clrMapOvr>
+  <p:timing>
+    <p:tnLst>
+      <p:par>
+        <p:cTn id="1" dur="indefinite" restart="never" nodeType="tmRoot"/>
+      </p:par>
+    </p:tnLst>
+  </p:timing>
 </p:sld>
 </file>
 
@@ -7780,21 +7786,26 @@
             <p:ph type="title"/>
           </p:nvPr>
         </p:nvSpPr>
-        <p:spPr/>
+        <p:spPr>
+          <a:xfrm>
+            <a:off x="1148437" y="120527"/>
+            <a:ext cx="8911687" cy="1280890"/>
+          </a:xfrm>
+        </p:spPr>
         <p:txBody>
           <a:bodyPr/>
           <a:lstStyle/>
           <a:p>
             <a:r>
               <a:rPr lang="en-CA" dirty="0"/>
-              <a:t>Search item </a:t>
+              <a:t>View the item and bid</a:t>
             </a:r>
           </a:p>
         </p:txBody>
       </p:sp>
       <p:pic>
         <p:nvPicPr>
-          <p:cNvPr id="4" name="Content Placeholder 3"/>
+          <p:cNvPr id="7" name="Content Placeholder 6"/>
           <p:cNvPicPr>
             <a:picLocks noGrp="1" noChangeAspect="1"/>
           </p:cNvPicPr>
@@ -7810,50 +7821,26 @@
         </p:blipFill>
         <p:spPr>
           <a:xfrm>
-            <a:off x="984893" y="3451347"/>
-            <a:ext cx="10519719" cy="2666711"/>
+            <a:off x="2939385" y="853738"/>
+            <a:ext cx="7755119" cy="5841231"/>
           </a:xfrm>
           <a:prstGeom prst="rect">
             <a:avLst/>
           </a:prstGeom>
         </p:spPr>
       </p:pic>
-      <p:pic>
-        <p:nvPicPr>
-          <p:cNvPr id="6" name="Picture 5"/>
-          <p:cNvPicPr>
-            <a:picLocks noChangeAspect="1"/>
-          </p:cNvPicPr>
+      <p:sp>
+        <p:nvSpPr>
+          <p:cNvPr id="8" name="Right Arrow 7"/>
+          <p:cNvSpPr/>
           <p:nvPr/>
-        </p:nvPicPr>
-        <p:blipFill>
-          <a:blip r:embed="rId3"/>
-          <a:stretch>
-            <a:fillRect/>
-          </a:stretch>
-        </p:blipFill>
+        </p:nvSpPr>
         <p:spPr>
           <a:xfrm>
-            <a:off x="1847849" y="1264555"/>
-            <a:ext cx="5811907" cy="1165575"/>
-          </a:xfrm>
-          <a:prstGeom prst="rect">
-            <a:avLst/>
-          </a:prstGeom>
-        </p:spPr>
-      </p:pic>
-      <p:sp>
-        <p:nvSpPr>
-          <p:cNvPr id="7" name="Notched Right Arrow 6"/>
-          <p:cNvSpPr/>
-          <p:nvPr/>
-        </p:nvSpPr>
-        <p:spPr>
-          <a:xfrm rot="19059318">
-            <a:off x="1659429" y="1938629"/>
-            <a:ext cx="1704243" cy="1092156"/>
-          </a:xfrm>
-          <a:prstGeom prst="notchedRightArrow">
+            <a:off x="689113" y="6069496"/>
+            <a:ext cx="3087757" cy="625473"/>
+          </a:xfrm>
+          <a:prstGeom prst="rightArrow">
             <a:avLst/>
           </a:prstGeom>
         </p:spPr>
@@ -7880,7 +7867,7 @@
             <a:pPr algn="ctr"/>
             <a:r>
               <a:rPr lang="en-CA" dirty="0"/>
-              <a:t>Search text</a:t>
+              <a:t>Must login or register</a:t>
             </a:r>
           </a:p>
         </p:txBody>
@@ -7888,13 +7875,20 @@
     </p:spTree>
     <p:extLst>
       <p:ext uri="{BB962C8B-B14F-4D97-AF65-F5344CB8AC3E}">
-        <p14:creationId xmlns:p14="http://schemas.microsoft.com/office/powerpoint/2010/main" val="2659307392"/>
+        <p14:creationId xmlns:p14="http://schemas.microsoft.com/office/powerpoint/2010/main" val="3210721126"/>
       </p:ext>
     </p:extLst>
   </p:cSld>
   <p:clrMapOvr>
     <a:masterClrMapping/>
   </p:clrMapOvr>
+  <p:timing>
+    <p:tnLst>
+      <p:par>
+        <p:cTn id="1" dur="indefinite" restart="never" nodeType="tmRoot"/>
+      </p:par>
+    </p:tnLst>
+  </p:timing>
 </p:sld>
 </file>
 
@@ -7927,8 +7921,8 @@
         </p:nvSpPr>
         <p:spPr>
           <a:xfrm>
-            <a:off x="1148437" y="120527"/>
-            <a:ext cx="8911687" cy="1280890"/>
+            <a:off x="1749288" y="163597"/>
+            <a:ext cx="10113134" cy="1280890"/>
           </a:xfrm>
         </p:spPr>
         <p:txBody>
@@ -7937,14 +7931,48 @@
           <a:p>
             <a:r>
               <a:rPr lang="en-CA" dirty="0"/>
-              <a:t>View the item and bid</a:t>
+              <a:t>Add item for sell(</a:t>
+            </a:r>
+            <a:r>
+              <a:rPr lang="en-CA" sz="2400" dirty="0">
+                <a:solidFill>
+                  <a:schemeClr val="accent1">
+                    <a:lumMod val="75000"/>
+                  </a:schemeClr>
+                </a:solidFill>
+              </a:rPr>
+              <a:t>only</a:t>
+            </a:r>
+            <a:r>
+              <a:rPr lang="en-CA" dirty="0">
+                <a:solidFill>
+                  <a:schemeClr val="accent1">
+                    <a:lumMod val="75000"/>
+                  </a:schemeClr>
+                </a:solidFill>
+              </a:rPr>
+              <a:t> </a:t>
+            </a:r>
+            <a:r>
+              <a:rPr lang="en-CA" sz="2400" dirty="0">
+                <a:solidFill>
+                  <a:schemeClr val="accent1">
+                    <a:lumMod val="75000"/>
+                  </a:schemeClr>
+                </a:solidFill>
+              </a:rPr>
+              <a:t>logged users can</a:t>
+            </a:r>
+            <a:r>
+              <a:rPr lang="en-CA" dirty="0"/>
+              <a:t>)</a:t>
             </a:r>
           </a:p>
         </p:txBody>
       </p:sp>
       <p:pic>
         <p:nvPicPr>
-          <p:cNvPr id="7" name="Content Placeholder 6"/>
+          <p:cNvPr id="4" name="Content Placeholder 5"/>
           <p:cNvPicPr>
             <a:picLocks noGrp="1" noChangeAspect="1"/>
           </p:cNvPicPr>
@@ -7960,67 +7988,31 @@
         </p:blipFill>
         <p:spPr>
           <a:xfrm>
-            <a:off x="2939385" y="853738"/>
-            <a:ext cx="7755119" cy="5841231"/>
+            <a:off x="1455158" y="1086678"/>
+            <a:ext cx="10058292" cy="5201673"/>
           </a:xfrm>
           <a:prstGeom prst="rect">
             <a:avLst/>
           </a:prstGeom>
         </p:spPr>
       </p:pic>
-      <p:sp>
-        <p:nvSpPr>
-          <p:cNvPr id="8" name="Right Arrow 7"/>
-          <p:cNvSpPr/>
-          <p:nvPr/>
-        </p:nvSpPr>
-        <p:spPr>
-          <a:xfrm>
-            <a:off x="689113" y="6069496"/>
-            <a:ext cx="3087757" cy="625473"/>
-          </a:xfrm>
-          <a:prstGeom prst="rightArrow">
-            <a:avLst/>
-          </a:prstGeom>
-        </p:spPr>
-        <p:style>
-          <a:lnRef idx="2">
-            <a:schemeClr val="accent1">
-              <a:shade val="50000"/>
-            </a:schemeClr>
-          </a:lnRef>
-          <a:fillRef idx="1">
-            <a:schemeClr val="accent1"/>
-          </a:fillRef>
-          <a:effectRef idx="0">
-            <a:schemeClr val="accent1"/>
-          </a:effectRef>
-          <a:fontRef idx="minor">
-            <a:schemeClr val="lt1"/>
-          </a:fontRef>
-        </p:style>
-        <p:txBody>
-          <a:bodyPr rtlCol="0" anchor="ctr"/>
-          <a:lstStyle/>
-          <a:p>
-            <a:pPr algn="ctr"/>
-            <a:r>
-              <a:rPr lang="en-CA" dirty="0"/>
-              <a:t>Must login or register</a:t>
-            </a:r>
-          </a:p>
-        </p:txBody>
-      </p:sp>
     </p:spTree>
     <p:extLst>
       <p:ext uri="{BB962C8B-B14F-4D97-AF65-F5344CB8AC3E}">
-        <p14:creationId xmlns:p14="http://schemas.microsoft.com/office/powerpoint/2010/main" val="3210721126"/>
+        <p14:creationId xmlns:p14="http://schemas.microsoft.com/office/powerpoint/2010/main" val="1920017863"/>
       </p:ext>
     </p:extLst>
   </p:cSld>
   <p:clrMapOvr>
     <a:masterClrMapping/>
   </p:clrMapOvr>
+  <p:timing>
+    <p:tnLst>
+      <p:par>
+        <p:cTn id="1" dur="indefinite" restart="never" nodeType="tmRoot"/>
+      </p:par>
+    </p:tnLst>
+  </p:timing>
 </p:sld>
 </file>
 
@@ -8053,8 +8045,8 @@
         </p:nvSpPr>
         <p:spPr>
           <a:xfrm>
-            <a:off x="1749288" y="163597"/>
-            <a:ext cx="10113134" cy="1280890"/>
+            <a:off x="1568510" y="173536"/>
+            <a:ext cx="8911687" cy="1280890"/>
           </a:xfrm>
         </p:spPr>
         <p:txBody>
@@ -8063,48 +8055,14 @@
           <a:p>
             <a:r>
               <a:rPr lang="en-CA" dirty="0"/>
-              <a:t>Add item for sell(</a:t>
-            </a:r>
-            <a:r>
-              <a:rPr lang="en-CA" sz="2400" dirty="0">
-                <a:solidFill>
-                  <a:schemeClr val="accent1">
-                    <a:lumMod val="75000"/>
-                  </a:schemeClr>
-                </a:solidFill>
-              </a:rPr>
-              <a:t>only</a:t>
-            </a:r>
-            <a:r>
-              <a:rPr lang="en-CA" dirty="0">
-                <a:solidFill>
-                  <a:schemeClr val="accent1">
-                    <a:lumMod val="75000"/>
-                  </a:schemeClr>
-                </a:solidFill>
-              </a:rPr>
-              <a:t> </a:t>
-            </a:r>
-            <a:r>
-              <a:rPr lang="en-CA" sz="2400" dirty="0">
-                <a:solidFill>
-                  <a:schemeClr val="accent1">
-                    <a:lumMod val="75000"/>
-                  </a:schemeClr>
-                </a:solidFill>
-              </a:rPr>
-              <a:t>logged users can</a:t>
-            </a:r>
-            <a:r>
-              <a:rPr lang="en-CA" dirty="0"/>
-              <a:t>)</a:t>
+              <a:t>User Home Page</a:t>
             </a:r>
           </a:p>
         </p:txBody>
       </p:sp>
       <p:pic>
         <p:nvPicPr>
-          <p:cNvPr id="4" name="Content Placeholder 5"/>
+          <p:cNvPr id="4" name="Content Placeholder 3"/>
           <p:cNvPicPr>
             <a:picLocks noGrp="1" noChangeAspect="1"/>
           </p:cNvPicPr>
@@ -8120,8 +8078,8 @@
         </p:blipFill>
         <p:spPr>
           <a:xfrm>
-            <a:off x="1455158" y="1086678"/>
-            <a:ext cx="10058292" cy="5201673"/>
+            <a:off x="1831281" y="1052520"/>
+            <a:ext cx="8386146" cy="5571486"/>
           </a:xfrm>
           <a:prstGeom prst="rect">
             <a:avLst/>
@@ -8131,13 +8089,20 @@
     </p:spTree>
     <p:extLst>
       <p:ext uri="{BB962C8B-B14F-4D97-AF65-F5344CB8AC3E}">
-        <p14:creationId xmlns:p14="http://schemas.microsoft.com/office/powerpoint/2010/main" val="1920017863"/>
+        <p14:creationId xmlns:p14="http://schemas.microsoft.com/office/powerpoint/2010/main" val="1650623233"/>
       </p:ext>
     </p:extLst>
   </p:cSld>
   <p:clrMapOvr>
     <a:masterClrMapping/>
   </p:clrMapOvr>
+  <p:timing>
+    <p:tnLst>
+      <p:par>
+        <p:cTn id="1" dur="indefinite" restart="never" nodeType="tmRoot"/>
+      </p:par>
+    </p:tnLst>
+  </p:timing>
 </p:sld>
 </file>
 
@@ -8170,8 +8135,8 @@
         </p:nvSpPr>
         <p:spPr>
           <a:xfrm>
-            <a:off x="1568510" y="173536"/>
-            <a:ext cx="8911687" cy="1280890"/>
+            <a:off x="1483111" y="584354"/>
+            <a:ext cx="3044964" cy="899890"/>
           </a:xfrm>
         </p:spPr>
         <p:txBody>
@@ -8180,31 +8145,117 @@
           <a:p>
             <a:r>
               <a:rPr lang="en-CA" dirty="0"/>
-              <a:t>User Home Page</a:t>
-            </a:r>
+              <a:t>Admin Page</a:t>
+            </a:r>
+          </a:p>
+        </p:txBody>
+      </p:sp>
+      <p:sp>
+        <p:nvSpPr>
+          <p:cNvPr id="7" name="TextBox 6"/>
+          <p:cNvSpPr txBox="1"/>
+          <p:nvPr/>
+        </p:nvSpPr>
+        <p:spPr>
+          <a:xfrm>
+            <a:off x="1113183" y="1696278"/>
+            <a:ext cx="4002156" cy="1754326"/>
+          </a:xfrm>
+          <a:prstGeom prst="rect">
+            <a:avLst/>
+          </a:prstGeom>
+          <a:noFill/>
+        </p:spPr>
+        <p:txBody>
+          <a:bodyPr wrap="square" rtlCol="0">
+            <a:spAutoFit/>
+          </a:bodyPr>
+          <a:lstStyle/>
+          <a:p>
+            <a:pPr marL="285750" indent="-285750">
+              <a:buFont typeface="Arial" panose="020B0604020202020204" pitchFamily="34" charset="0"/>
+              <a:buChar char="•"/>
+            </a:pPr>
+            <a:r>
+              <a:rPr lang="en-CA" dirty="0">
+                <a:solidFill>
+                  <a:schemeClr val="accent1">
+                    <a:lumMod val="75000"/>
+                  </a:schemeClr>
+                </a:solidFill>
+              </a:rPr>
+              <a:t>Add , Edit and Delete</a:t>
+            </a:r>
+          </a:p>
+          <a:p>
+            <a:r>
+              <a:rPr lang="en-CA" dirty="0"/>
+              <a:t>        - categories</a:t>
+            </a:r>
+          </a:p>
+          <a:p>
+            <a:r>
+              <a:rPr lang="en-CA" dirty="0"/>
+              <a:t>        - users</a:t>
+            </a:r>
+          </a:p>
+          <a:p>
+            <a:r>
+              <a:rPr lang="en-CA" dirty="0"/>
+              <a:t>   </a:t>
+            </a:r>
+          </a:p>
+          <a:p>
+            <a:pPr marL="285750" indent="-285750">
+              <a:buFont typeface="Arial" panose="020B0604020202020204" pitchFamily="34" charset="0"/>
+              <a:buChar char="•"/>
+            </a:pPr>
+            <a:r>
+              <a:rPr lang="en-CA" dirty="0">
+                <a:solidFill>
+                  <a:schemeClr val="accent1">
+                    <a:lumMod val="75000"/>
+                  </a:schemeClr>
+                </a:solidFill>
+              </a:rPr>
+              <a:t>Reports and print in pdf format </a:t>
+            </a:r>
+          </a:p>
+          <a:p>
+            <a:endParaRPr lang="en-CA" dirty="0">
+              <a:solidFill>
+                <a:schemeClr val="accent1">
+                  <a:lumMod val="75000"/>
+                </a:schemeClr>
+              </a:solidFill>
+            </a:endParaRPr>
           </a:p>
         </p:txBody>
       </p:sp>
       <p:pic>
         <p:nvPicPr>
-          <p:cNvPr id="4" name="Content Placeholder 3"/>
+          <p:cNvPr id="4" name="Picture 3"/>
           <p:cNvPicPr>
-            <a:picLocks noGrp="1" noChangeAspect="1"/>
+            <a:picLocks noChangeAspect="1"/>
           </p:cNvPicPr>
-          <p:nvPr>
-            <p:ph idx="1"/>
-          </p:nvPr>
+          <p:nvPr/>
         </p:nvPicPr>
         <p:blipFill>
-          <a:blip r:embed="rId2"/>
+          <a:blip r:embed="rId2">
+            <a:extLst>
+              <a:ext uri="{28A0092B-C50C-407E-A947-70E740481C1C}">
+                <a14:useLocalDpi xmlns:a14="http://schemas.microsoft.com/office/drawing/2010/main" val="0"/>
+              </a:ext>
+            </a:extLst>
+          </a:blip>
           <a:stretch>
             <a:fillRect/>
           </a:stretch>
         </p:blipFill>
         <p:spPr>
           <a:xfrm>
-            <a:off x="1831281" y="1052520"/>
-            <a:ext cx="8386146" cy="5571486"/>
+            <a:off x="4953665" y="226876"/>
+            <a:ext cx="7051498" cy="6399745"/>
           </a:xfrm>
           <a:prstGeom prst="rect">
             <a:avLst/>
@@ -8214,13 +8265,20 @@
     </p:spTree>
     <p:extLst>
       <p:ext uri="{BB962C8B-B14F-4D97-AF65-F5344CB8AC3E}">
-        <p14:creationId xmlns:p14="http://schemas.microsoft.com/office/powerpoint/2010/main" val="1650623233"/>
+        <p14:creationId xmlns:p14="http://schemas.microsoft.com/office/powerpoint/2010/main" val="1260560276"/>
       </p:ext>
     </p:extLst>
   </p:cSld>
   <p:clrMapOvr>
     <a:masterClrMapping/>
   </p:clrMapOvr>
+  <p:timing>
+    <p:tnLst>
+      <p:par>
+        <p:cTn id="1" dur="indefinite" restart="never" nodeType="tmRoot"/>
+      </p:par>
+    </p:tnLst>
+  </p:timing>
 </p:sld>
 </file>
 
@@ -8253,8 +8311,8 @@
         </p:nvSpPr>
         <p:spPr>
           <a:xfrm>
-            <a:off x="1916650" y="624110"/>
-            <a:ext cx="5084225" cy="899890"/>
+            <a:off x="1691777" y="94023"/>
+            <a:ext cx="8911687" cy="886638"/>
           </a:xfrm>
         </p:spPr>
         <p:txBody>
@@ -8263,21 +8321,44 @@
           <a:p>
             <a:r>
               <a:rPr lang="en-CA" dirty="0"/>
-              <a:t>Admin Page</a:t>
-            </a:r>
-          </a:p>
-        </p:txBody>
-      </p:sp>
-      <p:sp>
-        <p:nvSpPr>
-          <p:cNvPr id="7" name="TextBox 6"/>
+              <a:t>Schedule in server</a:t>
+            </a:r>
+          </a:p>
+        </p:txBody>
+      </p:sp>
+      <p:pic>
+        <p:nvPicPr>
+          <p:cNvPr id="8" name="Content Placeholder 7"/>
+          <p:cNvPicPr>
+            <a:picLocks noGrp="1" noChangeAspect="1"/>
+          </p:cNvPicPr>
+          <p:nvPr>
+            <p:ph idx="1"/>
+          </p:nvPr>
+        </p:nvPicPr>
+        <p:blipFill>
+          <a:blip r:embed="rId2"/>
+          <a:stretch>
+            <a:fillRect/>
+          </a:stretch>
+        </p:blipFill>
+        <p:spPr>
+          <a:xfrm>
+            <a:off x="390417" y="665076"/>
+            <a:ext cx="11514406" cy="1258957"/>
+          </a:xfrm>
+        </p:spPr>
+      </p:pic>
+      <p:sp>
+        <p:nvSpPr>
+          <p:cNvPr id="10" name="TextBox 9"/>
           <p:cNvSpPr txBox="1"/>
           <p:nvPr/>
         </p:nvSpPr>
         <p:spPr>
           <a:xfrm>
-            <a:off x="1113183" y="1696278"/>
-            <a:ext cx="4002156" cy="1754326"/>
+            <a:off x="503583" y="2491409"/>
+            <a:ext cx="10416208" cy="2902226"/>
           </a:xfrm>
           <a:prstGeom prst="rect">
             <a:avLst/>
@@ -8290,106 +8371,263 @@
           </a:bodyPr>
           <a:lstStyle/>
           <a:p>
-            <a:pPr marL="285750" indent="-285750">
-              <a:buFont typeface="Arial" panose="020B0604020202020204" pitchFamily="34" charset="0"/>
-              <a:buChar char="•"/>
-            </a:pPr>
-            <a:r>
-              <a:rPr lang="en-CA" dirty="0">
-                <a:solidFill>
-                  <a:schemeClr val="accent1">
-                    <a:lumMod val="75000"/>
-                  </a:schemeClr>
-                </a:solidFill>
-              </a:rPr>
-              <a:t>Add , Edit and Delete</a:t>
-            </a:r>
-          </a:p>
-          <a:p>
-            <a:r>
-              <a:rPr lang="en-CA" dirty="0"/>
-              <a:t>        - categories</a:t>
-            </a:r>
-          </a:p>
-          <a:p>
-            <a:r>
-              <a:rPr lang="en-CA" dirty="0"/>
-              <a:t>        - users</a:t>
-            </a:r>
-          </a:p>
-          <a:p>
-            <a:r>
-              <a:rPr lang="en-CA" dirty="0"/>
-              <a:t>   </a:t>
-            </a:r>
-          </a:p>
-          <a:p>
-            <a:pPr marL="285750" indent="-285750">
-              <a:buFont typeface="Arial" panose="020B0604020202020204" pitchFamily="34" charset="0"/>
-              <a:buChar char="•"/>
-            </a:pPr>
-            <a:r>
-              <a:rPr lang="en-CA" dirty="0">
-                <a:solidFill>
-                  <a:schemeClr val="accent1">
-                    <a:lumMod val="75000"/>
-                  </a:schemeClr>
-                </a:solidFill>
-              </a:rPr>
-              <a:t>Reports and print in pdf format </a:t>
-            </a:r>
-          </a:p>
-          <a:p>
-            <a:endParaRPr lang="en-CA" dirty="0">
-              <a:solidFill>
-                <a:schemeClr val="accent1">
-                  <a:lumMod val="75000"/>
-                </a:schemeClr>
-              </a:solidFill>
-            </a:endParaRPr>
+            <a:endParaRPr lang="en-CA" dirty="0"/>
           </a:p>
         </p:txBody>
       </p:sp>
       <p:pic>
         <p:nvPicPr>
-          <p:cNvPr id="3" name="Picture 2"/>
+          <p:cNvPr id="11" name="Picture 10"/>
           <p:cNvPicPr>
             <a:picLocks noChangeAspect="1"/>
           </p:cNvPicPr>
           <p:nvPr/>
         </p:nvPicPr>
         <p:blipFill>
-          <a:blip r:embed="rId2">
-            <a:extLst>
-              <a:ext uri="{28A0092B-C50C-407E-A947-70E740481C1C}">
-                <a14:useLocalDpi xmlns:a14="http://schemas.microsoft.com/office/drawing/2010/main" val="0"/>
-              </a:ext>
-            </a:extLst>
-          </a:blip>
+          <a:blip r:embed="rId3"/>
           <a:stretch>
             <a:fillRect/>
           </a:stretch>
         </p:blipFill>
         <p:spPr>
           <a:xfrm>
-            <a:off x="5058189" y="301315"/>
-            <a:ext cx="6913987" cy="6298578"/>
+            <a:off x="447000" y="1924033"/>
+            <a:ext cx="11401240" cy="1705372"/>
           </a:xfrm>
           <a:prstGeom prst="rect">
             <a:avLst/>
           </a:prstGeom>
         </p:spPr>
       </p:pic>
+      <p:sp>
+        <p:nvSpPr>
+          <p:cNvPr id="12" name="TextBox 11"/>
+          <p:cNvSpPr txBox="1"/>
+          <p:nvPr/>
+        </p:nvSpPr>
+        <p:spPr>
+          <a:xfrm>
+            <a:off x="1422351" y="3629405"/>
+            <a:ext cx="10769650" cy="3754874"/>
+          </a:xfrm>
+          <a:prstGeom prst="rect">
+            <a:avLst/>
+          </a:prstGeom>
+          <a:noFill/>
+        </p:spPr>
+        <p:txBody>
+          <a:bodyPr wrap="square" rtlCol="0">
+            <a:spAutoFit/>
+          </a:bodyPr>
+          <a:lstStyle/>
+          <a:p>
+            <a:r>
+              <a:rPr lang="en-CA" dirty="0"/>
+              <a:t>--</a:t>
+            </a:r>
+            <a:r>
+              <a:rPr lang="en-CA" sz="2000" b="1" dirty="0">
+                <a:solidFill>
+                  <a:srgbClr val="00B050"/>
+                </a:solidFill>
+              </a:rPr>
+              <a:t>Transaction</a:t>
+            </a:r>
+          </a:p>
+          <a:p>
+            <a:r>
+              <a:rPr lang="en-CA" sz="2000" dirty="0"/>
+              <a:t>If there are bids for item</a:t>
+            </a:r>
+          </a:p>
+          <a:p>
+            <a:r>
+              <a:rPr lang="en-CA" sz="2000" dirty="0"/>
+              <a:t>---send email to </a:t>
+            </a:r>
+            <a:r>
+              <a:rPr lang="en-CA" sz="2000" dirty="0">
+                <a:solidFill>
+                  <a:srgbClr val="00B050"/>
+                </a:solidFill>
+              </a:rPr>
+              <a:t>buyer</a:t>
+            </a:r>
+            <a:r>
+              <a:rPr lang="en-CA" sz="2000" dirty="0"/>
+              <a:t> who win bid and send email to </a:t>
+            </a:r>
+            <a:r>
+              <a:rPr lang="en-CA" sz="2000" dirty="0">
+                <a:solidFill>
+                  <a:srgbClr val="00B050"/>
+                </a:solidFill>
+              </a:rPr>
+              <a:t>seller</a:t>
+            </a:r>
+            <a:r>
+              <a:rPr lang="en-CA" sz="2000" dirty="0"/>
+              <a:t> that he/she can sell  own item</a:t>
+            </a:r>
+          </a:p>
+          <a:p>
+            <a:r>
+              <a:rPr lang="en-CA" sz="2000" dirty="0"/>
+              <a:t>--</a:t>
+            </a:r>
+            <a:r>
+              <a:rPr lang="en-CA" sz="2000" dirty="0">
+                <a:solidFill>
+                  <a:srgbClr val="00B050"/>
+                </a:solidFill>
+              </a:rPr>
+              <a:t>update</a:t>
+            </a:r>
+            <a:r>
+              <a:rPr lang="en-CA" sz="2000" dirty="0"/>
+              <a:t> status='sold‘ in </a:t>
+            </a:r>
+            <a:r>
+              <a:rPr lang="en-CA" sz="2000" dirty="0" err="1"/>
+              <a:t>itemsforsell</a:t>
+            </a:r>
+            <a:r>
+              <a:rPr lang="en-CA" sz="2000" dirty="0"/>
+              <a:t> table  and </a:t>
+            </a:r>
+            <a:r>
+              <a:rPr lang="en-CA" sz="2000" dirty="0">
+                <a:solidFill>
+                  <a:srgbClr val="00B050"/>
+                </a:solidFill>
+              </a:rPr>
+              <a:t>add</a:t>
+            </a:r>
+            <a:r>
+              <a:rPr lang="en-CA" sz="2000" dirty="0"/>
+              <a:t> to purchases table</a:t>
+            </a:r>
+          </a:p>
+          <a:p>
+            <a:r>
+              <a:rPr lang="en-CA" sz="2000" dirty="0"/>
+              <a:t>//</a:t>
+            </a:r>
+            <a:r>
+              <a:rPr lang="en-CA" sz="2000" dirty="0">
+                <a:solidFill>
+                  <a:srgbClr val="00B050"/>
+                </a:solidFill>
+              </a:rPr>
+              <a:t>decrease</a:t>
+            </a:r>
+            <a:r>
+              <a:rPr lang="en-CA" sz="2000" dirty="0"/>
+              <a:t> amount of  credit buyer  and </a:t>
+            </a:r>
+            <a:r>
+              <a:rPr lang="en-CA" sz="2000" dirty="0">
+                <a:solidFill>
+                  <a:srgbClr val="00B050"/>
+                </a:solidFill>
+              </a:rPr>
+              <a:t>add</a:t>
+            </a:r>
+            <a:r>
+              <a:rPr lang="en-CA" sz="2000" dirty="0"/>
+              <a:t> this amount to  credit of  seller</a:t>
+            </a:r>
+          </a:p>
+          <a:p>
+            <a:r>
+              <a:rPr lang="en-CA" sz="2000" dirty="0"/>
+              <a:t>Else</a:t>
+            </a:r>
+          </a:p>
+          <a:p>
+            <a:r>
+              <a:rPr lang="en-CA" sz="2000" dirty="0"/>
+              <a:t> --</a:t>
+            </a:r>
+            <a:r>
+              <a:rPr lang="en-CA" sz="2000" dirty="0">
+                <a:solidFill>
+                  <a:srgbClr val="00B050"/>
+                </a:solidFill>
+              </a:rPr>
+              <a:t>update</a:t>
+            </a:r>
+            <a:r>
+              <a:rPr lang="en-CA" sz="2000" dirty="0"/>
+              <a:t> 'status='</a:t>
+            </a:r>
+            <a:r>
+              <a:rPr lang="en-CA" sz="2000" dirty="0" err="1"/>
+              <a:t>notReachedToSell</a:t>
+            </a:r>
+            <a:r>
+              <a:rPr lang="en-CA" sz="2000" dirty="0"/>
+              <a:t>‘</a:t>
+            </a:r>
+          </a:p>
+          <a:p>
+            <a:r>
+              <a:rPr lang="en-CA" sz="2000" dirty="0"/>
+              <a:t>--- send email  to </a:t>
+            </a:r>
+            <a:r>
+              <a:rPr lang="en-CA" sz="2000" dirty="0">
+                <a:solidFill>
+                  <a:srgbClr val="00B050"/>
+                </a:solidFill>
+              </a:rPr>
+              <a:t>user</a:t>
+            </a:r>
+            <a:r>
+              <a:rPr lang="en-CA" sz="2000" dirty="0"/>
+              <a:t>(seller) “You can’t sell your item”</a:t>
+            </a:r>
+          </a:p>
+          <a:p>
+            <a:endParaRPr lang="en-CA" sz="2000" b="1" dirty="0">
+              <a:solidFill>
+                <a:srgbClr val="00B050"/>
+              </a:solidFill>
+            </a:endParaRPr>
+          </a:p>
+          <a:p>
+            <a:endParaRPr lang="en-CA" sz="2000" b="1" dirty="0">
+              <a:solidFill>
+                <a:srgbClr val="00B050"/>
+              </a:solidFill>
+            </a:endParaRPr>
+          </a:p>
+          <a:p>
+            <a:endParaRPr lang="en-CA" b="1" dirty="0">
+              <a:solidFill>
+                <a:srgbClr val="00B050"/>
+              </a:solidFill>
+            </a:endParaRPr>
+          </a:p>
+        </p:txBody>
+      </p:sp>
     </p:spTree>
     <p:extLst>
       <p:ext uri="{BB962C8B-B14F-4D97-AF65-F5344CB8AC3E}">
-        <p14:creationId xmlns:p14="http://schemas.microsoft.com/office/powerpoint/2010/main" val="1260560276"/>
+        <p14:creationId xmlns:p14="http://schemas.microsoft.com/office/powerpoint/2010/main" val="3040440494"/>
       </p:ext>
     </p:extLst>
   </p:cSld>
   <p:clrMapOvr>
     <a:masterClrMapping/>
   </p:clrMapOvr>
+  <p:timing>
+    <p:tnLst>
+      <p:par>
+        <p:cTn id="1" dur="indefinite" restart="never" nodeType="tmRoot"/>
+      </p:par>
+    </p:tnLst>
+  </p:timing>
 </p:sld>
 </file>
 
@@ -8422,348 +8660,6 @@
         </p:nvSpPr>
         <p:spPr>
           <a:xfrm>
-            <a:off x="1691777" y="94023"/>
-            <a:ext cx="8911687" cy="886638"/>
-          </a:xfrm>
-        </p:spPr>
-        <p:txBody>
-          <a:bodyPr/>
-          <a:lstStyle/>
-          <a:p>
-            <a:r>
-              <a:rPr lang="en-CA" dirty="0"/>
-              <a:t>Schedule in server</a:t>
-            </a:r>
-          </a:p>
-        </p:txBody>
-      </p:sp>
-      <p:pic>
-        <p:nvPicPr>
-          <p:cNvPr id="8" name="Content Placeholder 7"/>
-          <p:cNvPicPr>
-            <a:picLocks noGrp="1" noChangeAspect="1"/>
-          </p:cNvPicPr>
-          <p:nvPr>
-            <p:ph idx="1"/>
-          </p:nvPr>
-        </p:nvPicPr>
-        <p:blipFill>
-          <a:blip r:embed="rId2"/>
-          <a:stretch>
-            <a:fillRect/>
-          </a:stretch>
-        </p:blipFill>
-        <p:spPr>
-          <a:xfrm>
-            <a:off x="390417" y="665076"/>
-            <a:ext cx="11514406" cy="1258957"/>
-          </a:xfrm>
-        </p:spPr>
-      </p:pic>
-      <p:sp>
-        <p:nvSpPr>
-          <p:cNvPr id="10" name="TextBox 9"/>
-          <p:cNvSpPr txBox="1"/>
-          <p:nvPr/>
-        </p:nvSpPr>
-        <p:spPr>
-          <a:xfrm>
-            <a:off x="503583" y="2491409"/>
-            <a:ext cx="10416208" cy="2902226"/>
-          </a:xfrm>
-          <a:prstGeom prst="rect">
-            <a:avLst/>
-          </a:prstGeom>
-          <a:noFill/>
-        </p:spPr>
-        <p:txBody>
-          <a:bodyPr wrap="square" rtlCol="0">
-            <a:spAutoFit/>
-          </a:bodyPr>
-          <a:lstStyle/>
-          <a:p>
-            <a:endParaRPr lang="en-CA" dirty="0"/>
-          </a:p>
-        </p:txBody>
-      </p:sp>
-      <p:pic>
-        <p:nvPicPr>
-          <p:cNvPr id="11" name="Picture 10"/>
-          <p:cNvPicPr>
-            <a:picLocks noChangeAspect="1"/>
-          </p:cNvPicPr>
-          <p:nvPr/>
-        </p:nvPicPr>
-        <p:blipFill>
-          <a:blip r:embed="rId3"/>
-          <a:stretch>
-            <a:fillRect/>
-          </a:stretch>
-        </p:blipFill>
-        <p:spPr>
-          <a:xfrm>
-            <a:off x="447000" y="1924033"/>
-            <a:ext cx="11401240" cy="1705372"/>
-          </a:xfrm>
-          <a:prstGeom prst="rect">
-            <a:avLst/>
-          </a:prstGeom>
-        </p:spPr>
-      </p:pic>
-      <p:sp>
-        <p:nvSpPr>
-          <p:cNvPr id="12" name="TextBox 11"/>
-          <p:cNvSpPr txBox="1"/>
-          <p:nvPr/>
-        </p:nvSpPr>
-        <p:spPr>
-          <a:xfrm>
-            <a:off x="1422351" y="3629405"/>
-            <a:ext cx="10769650" cy="3754874"/>
-          </a:xfrm>
-          <a:prstGeom prst="rect">
-            <a:avLst/>
-          </a:prstGeom>
-          <a:noFill/>
-        </p:spPr>
-        <p:txBody>
-          <a:bodyPr wrap="square" rtlCol="0">
-            <a:spAutoFit/>
-          </a:bodyPr>
-          <a:lstStyle/>
-          <a:p>
-            <a:r>
-              <a:rPr lang="en-CA" dirty="0"/>
-              <a:t>--</a:t>
-            </a:r>
-            <a:r>
-              <a:rPr lang="en-CA" sz="2000" b="1" dirty="0">
-                <a:solidFill>
-                  <a:srgbClr val="00B050"/>
-                </a:solidFill>
-              </a:rPr>
-              <a:t>Transaction</a:t>
-            </a:r>
-          </a:p>
-          <a:p>
-            <a:r>
-              <a:rPr lang="en-CA" sz="2000" dirty="0"/>
-              <a:t>If there are bids for item</a:t>
-            </a:r>
-          </a:p>
-          <a:p>
-            <a:r>
-              <a:rPr lang="en-CA" sz="2000" dirty="0"/>
-              <a:t>---send email to </a:t>
-            </a:r>
-            <a:r>
-              <a:rPr lang="en-CA" sz="2000" dirty="0">
-                <a:solidFill>
-                  <a:srgbClr val="00B050"/>
-                </a:solidFill>
-              </a:rPr>
-              <a:t>buyer</a:t>
-            </a:r>
-            <a:r>
-              <a:rPr lang="en-CA" sz="2000" dirty="0"/>
-              <a:t> who win bid and send email to </a:t>
-            </a:r>
-            <a:r>
-              <a:rPr lang="en-CA" sz="2000" dirty="0">
-                <a:solidFill>
-                  <a:srgbClr val="00B050"/>
-                </a:solidFill>
-              </a:rPr>
-              <a:t>seller</a:t>
-            </a:r>
-            <a:r>
-              <a:rPr lang="en-CA" sz="2000" dirty="0"/>
-              <a:t> that he/she can sell  own item</a:t>
-            </a:r>
-          </a:p>
-          <a:p>
-            <a:r>
-              <a:rPr lang="en-CA" sz="2000" dirty="0"/>
-              <a:t>--</a:t>
-            </a:r>
-            <a:r>
-              <a:rPr lang="en-CA" sz="2000" dirty="0">
-                <a:solidFill>
-                  <a:srgbClr val="00B050"/>
-                </a:solidFill>
-              </a:rPr>
-              <a:t>update</a:t>
-            </a:r>
-            <a:r>
-              <a:rPr lang="en-CA" sz="2000" dirty="0"/>
-              <a:t> status='sold‘ in </a:t>
-            </a:r>
-            <a:r>
-              <a:rPr lang="en-CA" sz="2000" dirty="0" err="1"/>
-              <a:t>itemsforsell</a:t>
-            </a:r>
-            <a:r>
-              <a:rPr lang="en-CA" sz="2000" dirty="0"/>
-              <a:t> table  and </a:t>
-            </a:r>
-            <a:r>
-              <a:rPr lang="en-CA" sz="2000" dirty="0">
-                <a:solidFill>
-                  <a:srgbClr val="00B050"/>
-                </a:solidFill>
-              </a:rPr>
-              <a:t>add</a:t>
-            </a:r>
-            <a:r>
-              <a:rPr lang="en-CA" sz="2000" dirty="0"/>
-              <a:t> to purchases table</a:t>
-            </a:r>
-          </a:p>
-          <a:p>
-            <a:r>
-              <a:rPr lang="en-CA" sz="2000" dirty="0"/>
-              <a:t>//</a:t>
-            </a:r>
-            <a:r>
-              <a:rPr lang="en-CA" sz="2000" dirty="0">
-                <a:solidFill>
-                  <a:srgbClr val="00B050"/>
-                </a:solidFill>
-              </a:rPr>
-              <a:t>decrease</a:t>
-            </a:r>
-            <a:r>
-              <a:rPr lang="en-CA" sz="2000" dirty="0"/>
-              <a:t> amount of  credit buyer  and </a:t>
-            </a:r>
-            <a:r>
-              <a:rPr lang="en-CA" sz="2000" dirty="0">
-                <a:solidFill>
-                  <a:srgbClr val="00B050"/>
-                </a:solidFill>
-              </a:rPr>
-              <a:t>add</a:t>
-            </a:r>
-            <a:r>
-              <a:rPr lang="en-CA" sz="2000" dirty="0"/>
-              <a:t> this amount to  credit of  seller</a:t>
-            </a:r>
-          </a:p>
-          <a:p>
-            <a:r>
-              <a:rPr lang="en-CA" sz="2000" dirty="0"/>
-              <a:t>Else</a:t>
-            </a:r>
-          </a:p>
-          <a:p>
-            <a:r>
-              <a:rPr lang="en-CA" sz="2000" dirty="0"/>
-              <a:t> --</a:t>
-            </a:r>
-            <a:r>
-              <a:rPr lang="en-CA" sz="2000" dirty="0">
-                <a:solidFill>
-                  <a:srgbClr val="00B050"/>
-                </a:solidFill>
-              </a:rPr>
-              <a:t>update</a:t>
-            </a:r>
-            <a:r>
-              <a:rPr lang="en-CA" sz="2000" dirty="0"/>
-              <a:t> 'status='</a:t>
-            </a:r>
-            <a:r>
-              <a:rPr lang="en-CA" sz="2000" dirty="0" err="1"/>
-              <a:t>notReachedToSell</a:t>
-            </a:r>
-            <a:r>
-              <a:rPr lang="en-CA" sz="2000" dirty="0"/>
-              <a:t>‘</a:t>
-            </a:r>
-          </a:p>
-          <a:p>
-            <a:r>
-              <a:rPr lang="en-CA" sz="2000" dirty="0"/>
-              <a:t>--- send email  to </a:t>
-            </a:r>
-            <a:r>
-              <a:rPr lang="en-CA" sz="2000" dirty="0">
-                <a:solidFill>
-                  <a:srgbClr val="00B050"/>
-                </a:solidFill>
-              </a:rPr>
-              <a:t>user</a:t>
-            </a:r>
-            <a:r>
-              <a:rPr lang="en-CA" sz="2000" dirty="0"/>
-              <a:t>(seller) “You can’t sell your item”</a:t>
-            </a:r>
-          </a:p>
-          <a:p>
-            <a:endParaRPr lang="en-CA" sz="2000" b="1" dirty="0">
-              <a:solidFill>
-                <a:srgbClr val="00B050"/>
-              </a:solidFill>
-            </a:endParaRPr>
-          </a:p>
-          <a:p>
-            <a:endParaRPr lang="en-CA" sz="2000" b="1" dirty="0">
-              <a:solidFill>
-                <a:srgbClr val="00B050"/>
-              </a:solidFill>
-            </a:endParaRPr>
-          </a:p>
-          <a:p>
-            <a:endParaRPr lang="en-CA" b="1" dirty="0">
-              <a:solidFill>
-                <a:srgbClr val="00B050"/>
-              </a:solidFill>
-            </a:endParaRPr>
-          </a:p>
-        </p:txBody>
-      </p:sp>
-    </p:spTree>
-    <p:extLst>
-      <p:ext uri="{BB962C8B-B14F-4D97-AF65-F5344CB8AC3E}">
-        <p14:creationId xmlns:p14="http://schemas.microsoft.com/office/powerpoint/2010/main" val="3040440494"/>
-      </p:ext>
-    </p:extLst>
-  </p:cSld>
-  <p:clrMapOvr>
-    <a:masterClrMapping/>
-  </p:clrMapOvr>
-</p:sld>
-</file>
-
-<file path=ppt/slides/slide16.xml><?xml version="1.0" encoding="utf-8"?>
-<p:sld xmlns:a="http://schemas.openxmlformats.org/drawingml/2006/main" xmlns:r="http://schemas.openxmlformats.org/officeDocument/2006/relationships" xmlns:p="http://schemas.openxmlformats.org/presentationml/2006/main">
-  <p:cSld>
-    <p:spTree>
-      <p:nvGrpSpPr>
-        <p:cNvPr id="1" name=""/>
-        <p:cNvGrpSpPr/>
-        <p:nvPr/>
-      </p:nvGrpSpPr>
-      <p:grpSpPr>
-        <a:xfrm>
-          <a:off x="0" y="0"/>
-          <a:ext cx="0" cy="0"/>
-          <a:chOff x="0" y="0"/>
-          <a:chExt cx="0" cy="0"/>
-        </a:xfrm>
-      </p:grpSpPr>
-      <p:sp>
-        <p:nvSpPr>
-          <p:cNvPr id="2" name="Title 1"/>
-          <p:cNvSpPr>
-            <a:spLocks noGrp="1"/>
-          </p:cNvSpPr>
-          <p:nvPr>
-            <p:ph type="title"/>
-          </p:nvPr>
-        </p:nvSpPr>
-        <p:spPr>
-          <a:xfrm>
             <a:off x="1634184" y="625802"/>
             <a:ext cx="9461279" cy="1403720"/>
           </a:xfrm>
@@ -8848,10 +8744,17 @@
   <p:clrMapOvr>
     <a:masterClrMapping/>
   </p:clrMapOvr>
+  <p:timing>
+    <p:tnLst>
+      <p:par>
+        <p:cTn id="1" dur="indefinite" restart="never" nodeType="tmRoot"/>
+      </p:par>
+    </p:tnLst>
+  </p:timing>
 </p:sld>
 </file>
 
-<file path=ppt/slides/slide17.xml><?xml version="1.0" encoding="utf-8"?>
+<file path=ppt/slides/slide16.xml><?xml version="1.0" encoding="utf-8"?>
 <p:sld xmlns:a="http://schemas.openxmlformats.org/drawingml/2006/main" xmlns:r="http://schemas.openxmlformats.org/officeDocument/2006/relationships" xmlns:p="http://schemas.openxmlformats.org/presentationml/2006/main">
   <p:cSld>
     <p:spTree>
@@ -9013,6 +8916,155 @@
   <p:clrMapOvr>
     <a:masterClrMapping/>
   </p:clrMapOvr>
+  <p:timing>
+    <p:tnLst>
+      <p:par>
+        <p:cTn id="1" dur="indefinite" restart="never" nodeType="tmRoot"/>
+      </p:par>
+    </p:tnLst>
+  </p:timing>
+</p:sld>
+</file>
+
+<file path=ppt/slides/slide17.xml><?xml version="1.0" encoding="utf-8"?>
+<p:sld xmlns:a="http://schemas.openxmlformats.org/drawingml/2006/main" xmlns:r="http://schemas.openxmlformats.org/officeDocument/2006/relationships" xmlns:p="http://schemas.openxmlformats.org/presentationml/2006/main">
+  <p:cSld>
+    <p:spTree>
+      <p:nvGrpSpPr>
+        <p:cNvPr id="1" name=""/>
+        <p:cNvGrpSpPr/>
+        <p:nvPr/>
+      </p:nvGrpSpPr>
+      <p:grpSpPr>
+        <a:xfrm>
+          <a:off x="0" y="0"/>
+          <a:ext cx="0" cy="0"/>
+          <a:chOff x="0" y="0"/>
+          <a:chExt cx="0" cy="0"/>
+        </a:xfrm>
+      </p:grpSpPr>
+      <p:pic>
+        <p:nvPicPr>
+          <p:cNvPr id="4" name="Content Placeholder 3"/>
+          <p:cNvPicPr>
+            <a:picLocks noGrp="1" noChangeAspect="1"/>
+          </p:cNvPicPr>
+          <p:nvPr>
+            <p:ph idx="1"/>
+          </p:nvPr>
+        </p:nvPicPr>
+        <p:blipFill>
+          <a:blip r:embed="rId2">
+            <a:extLst>
+              <a:ext uri="{28A0092B-C50C-407E-A947-70E740481C1C}">
+                <a14:useLocalDpi xmlns:a14="http://schemas.microsoft.com/office/drawing/2010/main" val="0"/>
+              </a:ext>
+            </a:extLst>
+          </a:blip>
+          <a:stretch>
+            <a:fillRect/>
+          </a:stretch>
+        </p:blipFill>
+        <p:spPr>
+          <a:xfrm>
+            <a:off x="1640863" y="278786"/>
+            <a:ext cx="10395623" cy="6235236"/>
+          </a:xfrm>
+        </p:spPr>
+      </p:pic>
+      <p:sp>
+        <p:nvSpPr>
+          <p:cNvPr id="2" name="Title 1"/>
+          <p:cNvSpPr>
+            <a:spLocks noGrp="1"/>
+          </p:cNvSpPr>
+          <p:nvPr>
+            <p:ph type="title"/>
+          </p:nvPr>
+        </p:nvSpPr>
+        <p:spPr>
+          <a:xfrm>
+            <a:off x="7388213" y="926885"/>
+            <a:ext cx="3439621" cy="1738258"/>
+          </a:xfrm>
+        </p:spPr>
+        <p:txBody>
+          <a:bodyPr>
+            <a:normAutofit/>
+          </a:bodyPr>
+          <a:lstStyle/>
+          <a:p>
+            <a:r>
+              <a:rPr lang="en-US" sz="3200" dirty="0">
+                <a:solidFill>
+                  <a:schemeClr val="bg1"/>
+                </a:solidFill>
+                <a:highlight>
+                  <a:srgbClr val="800000"/>
+                </a:highlight>
+              </a:rPr>
+              <a:t>Facebook login challenge</a:t>
+            </a:r>
+            <a:br>
+              <a:rPr lang="en-US" sz="3200" dirty="0">
+                <a:solidFill>
+                  <a:schemeClr val="bg1"/>
+                </a:solidFill>
+                <a:highlight>
+                  <a:srgbClr val="800000"/>
+                </a:highlight>
+              </a:rPr>
+            </a:br>
+            <a:r>
+              <a:rPr lang="en-US" sz="3200" dirty="0">
+                <a:solidFill>
+                  <a:schemeClr val="bg1"/>
+                </a:solidFill>
+                <a:highlight>
+                  <a:srgbClr val="800000"/>
+                </a:highlight>
+              </a:rPr>
+              <a:t>3- </a:t>
+            </a:r>
+            <a:r>
+              <a:rPr lang="en-US" sz="3200" dirty="0" err="1">
+                <a:solidFill>
+                  <a:schemeClr val="bg1"/>
+                </a:solidFill>
+                <a:highlight>
+                  <a:srgbClr val="800000"/>
+                </a:highlight>
+              </a:rPr>
+              <a:t>index.php</a:t>
+            </a:r>
+            <a:endParaRPr lang="en-US" sz="3200" dirty="0">
+              <a:solidFill>
+                <a:schemeClr val="bg1"/>
+              </a:solidFill>
+              <a:highlight>
+                <a:srgbClr val="800000"/>
+              </a:highlight>
+            </a:endParaRPr>
+          </a:p>
+        </p:txBody>
+      </p:sp>
+    </p:spTree>
+    <p:extLst>
+      <p:ext uri="{BB962C8B-B14F-4D97-AF65-F5344CB8AC3E}">
+        <p14:creationId xmlns:p14="http://schemas.microsoft.com/office/powerpoint/2010/main" val="3811480394"/>
+      </p:ext>
+    </p:extLst>
+  </p:cSld>
+  <p:clrMapOvr>
+    <a:masterClrMapping/>
+  </p:clrMapOvr>
+  <p:timing>
+    <p:tnLst>
+      <p:par>
+        <p:cTn id="1" dur="indefinite" restart="never" nodeType="tmRoot"/>
+      </p:par>
+    </p:tnLst>
+  </p:timing>
 </p:sld>
 </file>
 
@@ -9035,7 +9087,7 @@
       </p:grpSpPr>
       <p:pic>
         <p:nvPicPr>
-          <p:cNvPr id="4" name="Content Placeholder 3"/>
+          <p:cNvPr id="5" name="Content Placeholder 4"/>
           <p:cNvPicPr>
             <a:picLocks noGrp="1" noChangeAspect="1"/>
           </p:cNvPicPr>
@@ -9057,8 +9109,8 @@
         </p:blipFill>
         <p:spPr>
           <a:xfrm>
-            <a:off x="1640863" y="278786"/>
-            <a:ext cx="10395623" cy="6235236"/>
+            <a:off x="1594625" y="88796"/>
+            <a:ext cx="7672038" cy="6660641"/>
           </a:xfrm>
         </p:spPr>
       </p:pic>
@@ -9074,7 +9126,7 @@
         </p:nvSpPr>
         <p:spPr>
           <a:xfrm>
-            <a:off x="7388213" y="926885"/>
+            <a:off x="8113041" y="1908193"/>
             <a:ext cx="3439621" cy="1738258"/>
           </a:xfrm>
         </p:spPr>
@@ -9114,7 +9166,7 @@
                   <a:srgbClr val="800000"/>
                 </a:highlight>
               </a:rPr>
-              <a:t>3- </a:t>
+              <a:t>4-1 </a:t>
             </a:r>
             <a:r>
               <a:rPr lang="en-US" sz="3200" dirty="0" err="1">
@@ -9125,7 +9177,7 @@
                   <a:srgbClr val="800000"/>
                 </a:highlight>
               </a:rPr>
-              <a:t>index.php</a:t>
+              <a:t>fblogin.php</a:t>
             </a:r>
             <a:endParaRPr lang="en-US" sz="3200" dirty="0">
               <a:solidFill>
@@ -9141,13 +9193,20 @@
     </p:spTree>
     <p:extLst>
       <p:ext uri="{BB962C8B-B14F-4D97-AF65-F5344CB8AC3E}">
-        <p14:creationId xmlns:p14="http://schemas.microsoft.com/office/powerpoint/2010/main" val="3811480394"/>
+        <p14:creationId xmlns:p14="http://schemas.microsoft.com/office/powerpoint/2010/main" val="3004704978"/>
       </p:ext>
     </p:extLst>
   </p:cSld>
   <p:clrMapOvr>
     <a:masterClrMapping/>
   </p:clrMapOvr>
+  <p:timing>
+    <p:tnLst>
+      <p:par>
+        <p:cTn id="1" dur="indefinite" restart="never" nodeType="tmRoot"/>
+      </p:par>
+    </p:tnLst>
+  </p:timing>
 </p:sld>
 </file>
 
@@ -9170,7 +9229,7 @@
       </p:grpSpPr>
       <p:pic>
         <p:nvPicPr>
-          <p:cNvPr id="5" name="Content Placeholder 4"/>
+          <p:cNvPr id="4" name="Content Placeholder 3"/>
           <p:cNvPicPr>
             <a:picLocks noGrp="1" noChangeAspect="1"/>
           </p:cNvPicPr>
@@ -9192,8 +9251,8 @@
         </p:blipFill>
         <p:spPr>
           <a:xfrm>
-            <a:off x="1594625" y="88796"/>
-            <a:ext cx="7672038" cy="6660641"/>
+            <a:off x="333309" y="246830"/>
+            <a:ext cx="11732312" cy="6412150"/>
           </a:xfrm>
         </p:spPr>
       </p:pic>
@@ -9209,7 +9268,7 @@
         </p:nvSpPr>
         <p:spPr>
           <a:xfrm>
-            <a:off x="8113041" y="1908193"/>
+            <a:off x="7377060" y="4171890"/>
             <a:ext cx="3439621" cy="1738258"/>
           </a:xfrm>
         </p:spPr>
@@ -9249,7 +9308,7 @@
                   <a:srgbClr val="800000"/>
                 </a:highlight>
               </a:rPr>
-              <a:t>4-1 </a:t>
+              <a:t>4-2 </a:t>
             </a:r>
             <a:r>
               <a:rPr lang="en-US" sz="3200" dirty="0" err="1">
@@ -9276,13 +9335,20 @@
     </p:spTree>
     <p:extLst>
       <p:ext uri="{BB962C8B-B14F-4D97-AF65-F5344CB8AC3E}">
-        <p14:creationId xmlns:p14="http://schemas.microsoft.com/office/powerpoint/2010/main" val="3004704978"/>
+        <p14:creationId xmlns:p14="http://schemas.microsoft.com/office/powerpoint/2010/main" val="2884712490"/>
       </p:ext>
     </p:extLst>
   </p:cSld>
   <p:clrMapOvr>
     <a:masterClrMapping/>
   </p:clrMapOvr>
+  <p:timing>
+    <p:tnLst>
+      <p:par>
+        <p:cTn id="1" dur="indefinite" restart="never" nodeType="tmRoot"/>
+      </p:par>
+    </p:tnLst>
+  </p:timing>
 </p:sld>
 </file>
 
@@ -9315,206 +9381,41 @@
         </p:nvSpPr>
         <p:spPr>
           <a:xfrm>
-            <a:off x="2135734" y="467996"/>
-            <a:ext cx="8911687" cy="803246"/>
-          </a:xfrm>
-        </p:spPr>
-        <p:txBody>
-          <a:bodyPr/>
-          <a:lstStyle/>
-          <a:p>
-            <a:r>
-              <a:rPr lang="en-US" b="1" dirty="0" err="1"/>
-              <a:t>Techopedia</a:t>
-            </a:r>
-            <a:r>
-              <a:rPr lang="en-US" b="1" dirty="0"/>
-              <a:t> explain of </a:t>
-            </a:r>
-            <a:r>
-              <a:rPr lang="en-US" b="1" i="1" dirty="0"/>
-              <a:t>Online Auction</a:t>
-            </a:r>
-            <a:endParaRPr lang="en-US" b="1" dirty="0"/>
-          </a:p>
-        </p:txBody>
-      </p:sp>
-      <p:sp>
-        <p:nvSpPr>
-          <p:cNvPr id="3" name="Content Placeholder 2"/>
-          <p:cNvSpPr>
-            <a:spLocks noGrp="1"/>
-          </p:cNvSpPr>
-          <p:nvPr>
-            <p:ph idx="1"/>
-          </p:nvPr>
-        </p:nvSpPr>
-        <p:spPr>
-          <a:xfrm>
-            <a:off x="1984917" y="1338145"/>
-            <a:ext cx="9701561" cy="5218771"/>
+            <a:off x="1102322" y="1476511"/>
+            <a:ext cx="1890375" cy="2522995"/>
           </a:xfrm>
         </p:spPr>
         <p:txBody>
           <a:bodyPr>
-            <a:normAutofit fontScale="85000" lnSpcReduction="20000"/>
+            <a:normAutofit/>
           </a:bodyPr>
           <a:lstStyle/>
           <a:p>
             <a:r>
+              <a:rPr lang="en-US" dirty="0" err="1"/>
+              <a:t>BestBid</a:t>
+            </a:r>
+            <a:r>
               <a:rPr lang="en-US" dirty="0"/>
-              <a:t>Online auctions mirror traditional auctions and usually involve multiple bidder participation. In both scenarios, bidders and sellers buy and sell tangible and intangible products and services. Starting bids are low but increase at steady rates to meet market demand and item popularity. The time span of an online auction ranges from one to 10 days for items offered 24/7 worldwide.</a:t>
+              <a:t/>
             </a:r>
             <a:br>
               <a:rPr lang="en-US" dirty="0"/>
             </a:br>
             <a:r>
               <a:rPr lang="en-US" dirty="0"/>
-              <a:t/>
+              <a:t>Home</a:t>
             </a:r>
             <a:br>
               <a:rPr lang="en-US" dirty="0"/>
             </a:br>
             <a:r>
               <a:rPr lang="en-US" dirty="0"/>
-              <a:t>Online auctions are a widely accepted business model for the following reasons:</a:t>
-            </a:r>
-            <a:br>
-              <a:rPr lang="en-US" dirty="0"/>
-            </a:br>
-            <a:endParaRPr lang="en-US" dirty="0"/>
-          </a:p>
-          <a:p>
-            <a:r>
-              <a:rPr lang="en-US" dirty="0"/>
-              <a:t>No fixed time constraint</a:t>
-            </a:r>
-          </a:p>
-          <a:p>
-            <a:r>
-              <a:rPr lang="en-US" dirty="0"/>
-              <a:t>Flexible time limits</a:t>
-            </a:r>
-          </a:p>
-          <a:p>
-            <a:r>
-              <a:rPr lang="en-US" dirty="0"/>
-              <a:t>No geographical limitations</a:t>
-            </a:r>
-          </a:p>
-          <a:p>
-            <a:r>
-              <a:rPr lang="en-US" dirty="0"/>
-              <a:t>Offers highly intensive social interactions</a:t>
-            </a:r>
-          </a:p>
-          <a:p>
-            <a:r>
-              <a:rPr lang="en-US" dirty="0"/>
-              <a:t>Includes a large numbers of sellers and bidders, which encourages a high-volume online business</a:t>
-            </a:r>
-          </a:p>
-          <a:p>
-            <a:r>
-              <a:rPr lang="en-US" dirty="0"/>
-              <a:t>Online auctions include business to business (B2B), business to consumer (B2C), and consumer to consumer (C2C) auctions. </a:t>
-            </a:r>
-            <a:r>
-              <a:rPr lang="en-US" dirty="0" err="1"/>
-              <a:t>Ebay</a:t>
-            </a:r>
-            <a:r>
-              <a:rPr lang="en-US" dirty="0"/>
-              <a:t> is the best example of an auction site that uses all three methodologies. </a:t>
-            </a:r>
-            <a:br>
-              <a:rPr lang="en-US" dirty="0"/>
-            </a:br>
-            <a:r>
-              <a:rPr lang="en-US" dirty="0"/>
-              <a:t/>
-            </a:r>
-            <a:br>
-              <a:rPr lang="en-US" dirty="0"/>
-            </a:br>
-            <a:r>
-              <a:rPr lang="en-US" dirty="0"/>
-              <a:t>The online auction business model continues to evolve according to market needs. Examples include eBay, </a:t>
-            </a:r>
-            <a:r>
-              <a:rPr lang="en-US" dirty="0" err="1"/>
-              <a:t>WebStore</a:t>
-            </a:r>
-            <a:r>
-              <a:rPr lang="en-US" dirty="0"/>
-              <a:t>, </a:t>
-            </a:r>
-            <a:r>
-              <a:rPr lang="en-US" dirty="0" err="1"/>
-              <a:t>OnlineAuction</a:t>
-            </a:r>
-            <a:r>
-              <a:rPr lang="en-US" dirty="0"/>
-              <a:t> and Overstock. </a:t>
-            </a:r>
-            <a:r>
-              <a:rPr lang="en-US" dirty="0" err="1"/>
-              <a:t>Ebay</a:t>
-            </a:r>
-            <a:r>
-              <a:rPr lang="en-US" dirty="0"/>
-              <a:t> and other providers encourage legitimate bidding activity through bidder block lists. EBay also offers Dutch auctions for large inventories, where auction bidders pay according to an item's highest sale price. </a:t>
-            </a:r>
-            <a:br>
-              <a:rPr lang="en-US" dirty="0"/>
-            </a:br>
-            <a:r>
-              <a:rPr lang="en-US" dirty="0"/>
-              <a:t/>
-            </a:r>
-            <a:br>
-              <a:rPr lang="en-US" dirty="0"/>
-            </a:br>
-            <a:r>
-              <a:rPr lang="en-US" dirty="0"/>
-              <a:t>Like other online services and activities, online auctions can attract stolen or pirated products.</a:t>
-            </a:r>
-          </a:p>
-          <a:p>
-            <a:endParaRPr lang="en-US" dirty="0"/>
-          </a:p>
-        </p:txBody>
-      </p:sp>
-    </p:spTree>
-    <p:extLst>
-      <p:ext uri="{BB962C8B-B14F-4D97-AF65-F5344CB8AC3E}">
-        <p14:creationId xmlns:p14="http://schemas.microsoft.com/office/powerpoint/2010/main" val="4278376240"/>
-      </p:ext>
-    </p:extLst>
-  </p:cSld>
-  <p:clrMapOvr>
-    <a:masterClrMapping/>
-  </p:clrMapOvr>
-</p:sld>
-</file>
-
-<file path=ppt/slides/slide20.xml><?xml version="1.0" encoding="utf-8"?>
-<p:sld xmlns:a="http://schemas.openxmlformats.org/drawingml/2006/main" xmlns:r="http://schemas.openxmlformats.org/officeDocument/2006/relationships" xmlns:p="http://schemas.openxmlformats.org/presentationml/2006/main">
-  <p:cSld>
-    <p:spTree>
-      <p:nvGrpSpPr>
-        <p:cNvPr id="1" name=""/>
-        <p:cNvGrpSpPr/>
-        <p:nvPr/>
-      </p:nvGrpSpPr>
-      <p:grpSpPr>
-        <a:xfrm>
-          <a:off x="0" y="0"/>
-          <a:ext cx="0" cy="0"/>
-          <a:chOff x="0" y="0"/>
-          <a:chExt cx="0" cy="0"/>
-        </a:xfrm>
-      </p:grpSpPr>
+              <a:t>page</a:t>
+            </a:r>
+          </a:p>
+        </p:txBody>
+      </p:sp>
       <p:pic>
         <p:nvPicPr>
           <p:cNvPr id="4" name="Content Placeholder 3"/>
@@ -9539,101 +9440,32 @@
         </p:blipFill>
         <p:spPr>
           <a:xfrm>
-            <a:off x="333309" y="246830"/>
-            <a:ext cx="11732312" cy="6412150"/>
+            <a:off x="3095775" y="153724"/>
+            <a:ext cx="8417714" cy="6558962"/>
           </a:xfrm>
         </p:spPr>
       </p:pic>
-      <p:sp>
-        <p:nvSpPr>
-          <p:cNvPr id="2" name="Title 1"/>
-          <p:cNvSpPr>
-            <a:spLocks noGrp="1"/>
-          </p:cNvSpPr>
-          <p:nvPr>
-            <p:ph type="title"/>
-          </p:nvPr>
-        </p:nvSpPr>
-        <p:spPr>
-          <a:xfrm>
-            <a:off x="7377060" y="4171890"/>
-            <a:ext cx="3439621" cy="1738258"/>
-          </a:xfrm>
-        </p:spPr>
-        <p:txBody>
-          <a:bodyPr>
-            <a:normAutofit/>
-          </a:bodyPr>
-          <a:lstStyle/>
-          <a:p>
-            <a:r>
-              <a:rPr lang="en-US" sz="3200" dirty="0">
-                <a:solidFill>
-                  <a:schemeClr val="bg1"/>
-                </a:solidFill>
-                <a:highlight>
-                  <a:srgbClr val="800000"/>
-                </a:highlight>
-              </a:rPr>
-              <a:t>Facebook login challenge</a:t>
-            </a:r>
-            <a:br>
-              <a:rPr lang="en-US" sz="3200" dirty="0">
-                <a:solidFill>
-                  <a:schemeClr val="bg1"/>
-                </a:solidFill>
-                <a:highlight>
-                  <a:srgbClr val="800000"/>
-                </a:highlight>
-              </a:rPr>
-            </a:br>
-            <a:r>
-              <a:rPr lang="en-US" sz="3200" dirty="0">
-                <a:solidFill>
-                  <a:schemeClr val="bg1"/>
-                </a:solidFill>
-                <a:highlight>
-                  <a:srgbClr val="800000"/>
-                </a:highlight>
-              </a:rPr>
-              <a:t>4-2 </a:t>
-            </a:r>
-            <a:r>
-              <a:rPr lang="en-US" sz="3200" dirty="0" err="1">
-                <a:solidFill>
-                  <a:schemeClr val="bg1"/>
-                </a:solidFill>
-                <a:highlight>
-                  <a:srgbClr val="800000"/>
-                </a:highlight>
-              </a:rPr>
-              <a:t>fblogin.php</a:t>
-            </a:r>
-            <a:endParaRPr lang="en-US" sz="3200" dirty="0">
-              <a:solidFill>
-                <a:schemeClr val="bg1"/>
-              </a:solidFill>
-              <a:highlight>
-                <a:srgbClr val="800000"/>
-              </a:highlight>
-            </a:endParaRPr>
-          </a:p>
-        </p:txBody>
-      </p:sp>
     </p:spTree>
     <p:extLst>
       <p:ext uri="{BB962C8B-B14F-4D97-AF65-F5344CB8AC3E}">
-        <p14:creationId xmlns:p14="http://schemas.microsoft.com/office/powerpoint/2010/main" val="2884712490"/>
+        <p14:creationId xmlns:p14="http://schemas.microsoft.com/office/powerpoint/2010/main" val="576732689"/>
       </p:ext>
     </p:extLst>
   </p:cSld>
   <p:clrMapOvr>
     <a:masterClrMapping/>
   </p:clrMapOvr>
+  <p:timing>
+    <p:tnLst>
+      <p:par>
+        <p:cTn id="1" dur="indefinite" restart="never" nodeType="tmRoot"/>
+      </p:par>
+    </p:tnLst>
+  </p:timing>
 </p:sld>
 </file>
 
-<file path=ppt/slides/slide21.xml><?xml version="1.0" encoding="utf-8"?>
+<file path=ppt/slides/slide20.xml><?xml version="1.0" encoding="utf-8"?>
 <p:sld xmlns:a="http://schemas.openxmlformats.org/drawingml/2006/main" xmlns:r="http://schemas.openxmlformats.org/officeDocument/2006/relationships" xmlns:p="http://schemas.openxmlformats.org/presentationml/2006/main">
   <p:cSld>
     <p:spTree>
@@ -9869,10 +9701,17 @@
   <p:clrMapOvr>
     <a:masterClrMapping/>
   </p:clrMapOvr>
+  <p:timing>
+    <p:tnLst>
+      <p:par>
+        <p:cTn id="1" dur="indefinite" restart="never" nodeType="tmRoot"/>
+      </p:par>
+    </p:tnLst>
+  </p:timing>
 </p:sld>
 </file>
 
-<file path=ppt/slides/slide22.xml><?xml version="1.0" encoding="utf-8"?>
+<file path=ppt/slides/slide21.xml><?xml version="1.0" encoding="utf-8"?>
 <p:sld xmlns:a="http://schemas.openxmlformats.org/drawingml/2006/main" xmlns:r="http://schemas.openxmlformats.org/officeDocument/2006/relationships" xmlns:p="http://schemas.openxmlformats.org/presentationml/2006/main">
   <p:cSld>
     <p:spTree>
@@ -10078,7 +9917,7 @@
 </p:sld>
 </file>
 
-<file path=ppt/slides/slide23.xml><?xml version="1.0" encoding="utf-8"?>
+<file path=ppt/slides/slide22.xml><?xml version="1.0" encoding="utf-8"?>
 <p:sld xmlns:a="http://schemas.openxmlformats.org/drawingml/2006/main" xmlns:r="http://schemas.openxmlformats.org/officeDocument/2006/relationships" xmlns:p="http://schemas.openxmlformats.org/presentationml/2006/main">
   <p:cSld>
     <p:spTree>
@@ -10203,7 +10042,7 @@
 </p:sld>
 </file>
 
-<file path=ppt/slides/slide24.xml><?xml version="1.0" encoding="utf-8"?>
+<file path=ppt/slides/slide23.xml><?xml version="1.0" encoding="utf-8"?>
 <p:sld xmlns:a="http://schemas.openxmlformats.org/drawingml/2006/main" xmlns:r="http://schemas.openxmlformats.org/officeDocument/2006/relationships" xmlns:p="http://schemas.openxmlformats.org/presentationml/2006/main">
   <p:cSld>
     <p:spTree>
@@ -10286,7 +10125,7 @@
 </p:sld>
 </file>
 
-<file path=ppt/slides/slide25.xml><?xml version="1.0" encoding="utf-8"?>
+<file path=ppt/slides/slide24.xml><?xml version="1.0" encoding="utf-8"?>
 <p:sld xmlns:a="http://schemas.openxmlformats.org/drawingml/2006/main" xmlns:r="http://schemas.openxmlformats.org/officeDocument/2006/relationships" xmlns:p="http://schemas.openxmlformats.org/presentationml/2006/main">
   <p:cSld>
     <p:spTree>
@@ -10413,8 +10252,8 @@
         </p:nvSpPr>
         <p:spPr>
           <a:xfrm>
-            <a:off x="1666863" y="1222069"/>
-            <a:ext cx="1890375" cy="4855346"/>
+            <a:off x="1784866" y="1218356"/>
+            <a:ext cx="3010159" cy="4212288"/>
           </a:xfrm>
         </p:spPr>
         <p:txBody>
@@ -10424,26 +10263,12 @@
           <a:lstStyle/>
           <a:p>
             <a:r>
-              <a:rPr lang="en-US" dirty="0" err="1"/>
-              <a:t>BestBid</a:t>
-            </a:r>
-            <a:r>
-              <a:rPr lang="en-US" dirty="0"/>
-              <a:t/>
-            </a:r>
-            <a:br>
-              <a:rPr lang="en-US" dirty="0"/>
-            </a:br>
-            <a:r>
-              <a:rPr lang="en-US" dirty="0"/>
-              <a:t>Home</a:t>
-            </a:r>
-            <a:br>
-              <a:rPr lang="en-US" dirty="0"/>
-            </a:br>
-            <a:r>
-              <a:rPr lang="en-US" dirty="0"/>
-              <a:t>page</a:t>
+              <a:rPr lang="en-CA" dirty="0" err="1"/>
+              <a:t>Bestbid</a:t>
+            </a:r>
+            <a:r>
+              <a:rPr lang="en-CA" dirty="0"/>
+              <a:t> registration</a:t>
             </a:r>
           </a:p>
         </p:txBody>
@@ -10472,21 +10297,28 @@
         </p:blipFill>
         <p:spPr>
           <a:xfrm>
-            <a:off x="3579540" y="209547"/>
-            <a:ext cx="7950818" cy="6505215"/>
+            <a:off x="4738086" y="371507"/>
+            <a:ext cx="6591553" cy="6202119"/>
           </a:xfrm>
         </p:spPr>
       </p:pic>
     </p:spTree>
     <p:extLst>
       <p:ext uri="{BB962C8B-B14F-4D97-AF65-F5344CB8AC3E}">
-        <p14:creationId xmlns:p14="http://schemas.microsoft.com/office/powerpoint/2010/main" val="576732689"/>
+        <p14:creationId xmlns:p14="http://schemas.microsoft.com/office/powerpoint/2010/main" val="4184334311"/>
       </p:ext>
     </p:extLst>
   </p:cSld>
   <p:clrMapOvr>
     <a:masterClrMapping/>
   </p:clrMapOvr>
+  <p:timing>
+    <p:tnLst>
+      <p:par>
+        <p:cTn id="1" dur="indefinite" restart="never" nodeType="tmRoot"/>
+      </p:par>
+    </p:tnLst>
+  </p:timing>
 </p:sld>
 </file>
 
@@ -10530,19 +10362,23 @@
           <a:lstStyle/>
           <a:p>
             <a:r>
+              <a:rPr lang="en-CA" dirty="0"/>
+              <a:t>You can login with your </a:t>
+            </a:r>
+            <a:r>
               <a:rPr lang="en-CA" dirty="0" err="1"/>
               <a:t>Bestbid</a:t>
             </a:r>
             <a:r>
               <a:rPr lang="en-CA" dirty="0"/>
-              <a:t> registration</a:t>
+              <a:t> account or by your Facebook account</a:t>
             </a:r>
           </a:p>
         </p:txBody>
       </p:sp>
       <p:pic>
         <p:nvPicPr>
-          <p:cNvPr id="7" name="Content Placeholder 6"/>
+          <p:cNvPr id="5" name="Content Placeholder 4"/>
           <p:cNvPicPr>
             <a:picLocks noGrp="1" noChangeAspect="1"/>
           </p:cNvPicPr>
@@ -10564,21 +10400,28 @@
         </p:blipFill>
         <p:spPr>
           <a:xfrm>
-            <a:off x="4738086" y="371507"/>
-            <a:ext cx="6591553" cy="6202119"/>
+            <a:off x="5586567" y="568711"/>
+            <a:ext cx="5864201" cy="5408729"/>
           </a:xfrm>
         </p:spPr>
       </p:pic>
     </p:spTree>
     <p:extLst>
       <p:ext uri="{BB962C8B-B14F-4D97-AF65-F5344CB8AC3E}">
-        <p14:creationId xmlns:p14="http://schemas.microsoft.com/office/powerpoint/2010/main" val="4184334311"/>
+        <p14:creationId xmlns:p14="http://schemas.microsoft.com/office/powerpoint/2010/main" val="3382213278"/>
       </p:ext>
     </p:extLst>
   </p:cSld>
   <p:clrMapOvr>
     <a:masterClrMapping/>
   </p:clrMapOvr>
+  <p:timing>
+    <p:tnLst>
+      <p:par>
+        <p:cTn id="1" dur="indefinite" restart="never" nodeType="tmRoot"/>
+      </p:par>
+    </p:tnLst>
+  </p:timing>
 </p:sld>
 </file>
 
@@ -10611,8 +10454,8 @@
         </p:nvSpPr>
         <p:spPr>
           <a:xfrm>
-            <a:off x="1784866" y="1218356"/>
-            <a:ext cx="3010159" cy="4212288"/>
+            <a:off x="2030188" y="605051"/>
+            <a:ext cx="8240080" cy="677351"/>
           </a:xfrm>
         </p:spPr>
         <p:txBody>
@@ -10623,22 +10466,14 @@
           <a:p>
             <a:r>
               <a:rPr lang="en-CA" dirty="0"/>
-              <a:t>You can login with your </a:t>
-            </a:r>
-            <a:r>
-              <a:rPr lang="en-CA" dirty="0" err="1"/>
-              <a:t>Bestbid</a:t>
-            </a:r>
-            <a:r>
-              <a:rPr lang="en-CA" dirty="0"/>
-              <a:t> account or by your Facebook account</a:t>
+              <a:t>login with Facebook account</a:t>
             </a:r>
           </a:p>
         </p:txBody>
       </p:sp>
       <p:pic>
         <p:nvPicPr>
-          <p:cNvPr id="5" name="Content Placeholder 4"/>
+          <p:cNvPr id="4" name="Content Placeholder 3"/>
           <p:cNvPicPr>
             <a:picLocks noGrp="1" noChangeAspect="1"/>
           </p:cNvPicPr>
@@ -10660,21 +10495,28 @@
         </p:blipFill>
         <p:spPr>
           <a:xfrm>
-            <a:off x="5586567" y="568711"/>
-            <a:ext cx="5864201" cy="5408729"/>
+            <a:off x="1842294" y="1341862"/>
+            <a:ext cx="9163960" cy="5094541"/>
           </a:xfrm>
         </p:spPr>
       </p:pic>
     </p:spTree>
     <p:extLst>
       <p:ext uri="{BB962C8B-B14F-4D97-AF65-F5344CB8AC3E}">
-        <p14:creationId xmlns:p14="http://schemas.microsoft.com/office/powerpoint/2010/main" val="3382213278"/>
+        <p14:creationId xmlns:p14="http://schemas.microsoft.com/office/powerpoint/2010/main" val="435969010"/>
       </p:ext>
     </p:extLst>
   </p:cSld>
   <p:clrMapOvr>
     <a:masterClrMapping/>
   </p:clrMapOvr>
+  <p:timing>
+    <p:tnLst>
+      <p:par>
+        <p:cTn id="1" dur="indefinite" restart="never" nodeType="tmRoot"/>
+      </p:par>
+    </p:tnLst>
+  </p:timing>
 </p:sld>
 </file>
 
@@ -10707,8 +10549,8 @@
         </p:nvSpPr>
         <p:spPr>
           <a:xfrm>
-            <a:off x="2030188" y="605051"/>
-            <a:ext cx="8240080" cy="677351"/>
+            <a:off x="1784866" y="1218356"/>
+            <a:ext cx="8284685" cy="1223761"/>
           </a:xfrm>
         </p:spPr>
         <p:txBody>
@@ -10719,7 +10561,7 @@
           <a:p>
             <a:r>
               <a:rPr lang="en-CA" dirty="0"/>
-              <a:t>login with Facebook account</a:t>
+              <a:t>Successful login</a:t>
             </a:r>
           </a:p>
         </p:txBody>
@@ -10748,21 +10590,28 @@
         </p:blipFill>
         <p:spPr>
           <a:xfrm>
-            <a:off x="1842294" y="1341862"/>
-            <a:ext cx="9163960" cy="5094541"/>
+            <a:off x="1044537" y="3224134"/>
+            <a:ext cx="10891214" cy="834910"/>
           </a:xfrm>
         </p:spPr>
       </p:pic>
     </p:spTree>
     <p:extLst>
       <p:ext uri="{BB962C8B-B14F-4D97-AF65-F5344CB8AC3E}">
-        <p14:creationId xmlns:p14="http://schemas.microsoft.com/office/powerpoint/2010/main" val="435969010"/>
+        <p14:creationId xmlns:p14="http://schemas.microsoft.com/office/powerpoint/2010/main" val="239879218"/>
       </p:ext>
     </p:extLst>
   </p:cSld>
   <p:clrMapOvr>
     <a:masterClrMapping/>
   </p:clrMapOvr>
+  <p:timing>
+    <p:tnLst>
+      <p:par>
+        <p:cTn id="1" dur="indefinite" restart="never" nodeType="tmRoot"/>
+      </p:par>
+    </p:tnLst>
+  </p:timing>
 </p:sld>
 </file>
 
@@ -10795,62 +10644,110 @@
         </p:nvSpPr>
         <p:spPr>
           <a:xfrm>
-            <a:off x="1784866" y="1218356"/>
-            <a:ext cx="8284685" cy="1223761"/>
-          </a:xfrm>
-        </p:spPr>
-        <p:txBody>
-          <a:bodyPr>
-            <a:normAutofit/>
-          </a:bodyPr>
+            <a:off x="2027583" y="624110"/>
+            <a:ext cx="9477029" cy="1280890"/>
+          </a:xfrm>
+        </p:spPr>
+        <p:txBody>
+          <a:bodyPr/>
           <a:lstStyle/>
           <a:p>
             <a:r>
               <a:rPr lang="en-CA" dirty="0"/>
-              <a:t>Successful login</a:t>
+              <a:t>Dynamic categories and sub categories</a:t>
             </a:r>
           </a:p>
         </p:txBody>
       </p:sp>
       <p:pic>
         <p:nvPicPr>
-          <p:cNvPr id="4" name="Content Placeholder 3"/>
+          <p:cNvPr id="8" name="Picture 7"/>
           <p:cNvPicPr>
-            <a:picLocks noGrp="1" noChangeAspect="1"/>
+            <a:picLocks noChangeAspect="1"/>
           </p:cNvPicPr>
-          <p:nvPr>
-            <p:ph idx="1"/>
-          </p:nvPr>
+          <p:nvPr/>
         </p:nvPicPr>
         <p:blipFill>
-          <a:blip r:embed="rId2">
-            <a:extLst>
-              <a:ext uri="{28A0092B-C50C-407E-A947-70E740481C1C}">
-                <a14:useLocalDpi xmlns:a14="http://schemas.microsoft.com/office/drawing/2010/main" val="0"/>
-              </a:ext>
-            </a:extLst>
-          </a:blip>
+          <a:blip r:embed="rId2"/>
           <a:stretch>
             <a:fillRect/>
           </a:stretch>
         </p:blipFill>
         <p:spPr>
           <a:xfrm>
-            <a:off x="1044537" y="3224134"/>
-            <a:ext cx="10891214" cy="834910"/>
-          </a:xfrm>
+            <a:off x="1330256" y="1563756"/>
+            <a:ext cx="4610100" cy="2261360"/>
+          </a:xfrm>
+          <a:prstGeom prst="rect">
+            <a:avLst/>
+          </a:prstGeom>
+        </p:spPr>
+      </p:pic>
+      <p:pic>
+        <p:nvPicPr>
+          <p:cNvPr id="11" name="Picture 10"/>
+          <p:cNvPicPr>
+            <a:picLocks noChangeAspect="1"/>
+          </p:cNvPicPr>
+          <p:nvPr/>
+        </p:nvPicPr>
+        <p:blipFill>
+          <a:blip r:embed="rId3"/>
+          <a:stretch>
+            <a:fillRect/>
+          </a:stretch>
+        </p:blipFill>
+        <p:spPr>
+          <a:xfrm>
+            <a:off x="6302340" y="1586741"/>
+            <a:ext cx="5067300" cy="2238375"/>
+          </a:xfrm>
+          <a:prstGeom prst="rect">
+            <a:avLst/>
+          </a:prstGeom>
+        </p:spPr>
+      </p:pic>
+      <p:pic>
+        <p:nvPicPr>
+          <p:cNvPr id="13" name="Picture 12"/>
+          <p:cNvPicPr>
+            <a:picLocks noChangeAspect="1"/>
+          </p:cNvPicPr>
+          <p:nvPr/>
+        </p:nvPicPr>
+        <p:blipFill>
+          <a:blip r:embed="rId4"/>
+          <a:stretch>
+            <a:fillRect/>
+          </a:stretch>
+        </p:blipFill>
+        <p:spPr>
+          <a:xfrm>
+            <a:off x="3421027" y="3962400"/>
+            <a:ext cx="5762625" cy="2637183"/>
+          </a:xfrm>
+          <a:prstGeom prst="rect">
+            <a:avLst/>
+          </a:prstGeom>
         </p:spPr>
       </p:pic>
     </p:spTree>
     <p:extLst>
       <p:ext uri="{BB962C8B-B14F-4D97-AF65-F5344CB8AC3E}">
-        <p14:creationId xmlns:p14="http://schemas.microsoft.com/office/powerpoint/2010/main" val="239879218"/>
+        <p14:creationId xmlns:p14="http://schemas.microsoft.com/office/powerpoint/2010/main" val="2722291298"/>
       </p:ext>
     </p:extLst>
   </p:cSld>
   <p:clrMapOvr>
     <a:masterClrMapping/>
   </p:clrMapOvr>
+  <p:timing>
+    <p:tnLst>
+      <p:par>
+        <p:cTn id="1" dur="indefinite" restart="never" nodeType="tmRoot"/>
+      </p:par>
+    </p:tnLst>
+  </p:timing>
 </p:sld>
 </file>
 
@@ -10883,8 +10780,8 @@
         </p:nvSpPr>
         <p:spPr>
           <a:xfrm>
-            <a:off x="2027583" y="624110"/>
-            <a:ext cx="9477029" cy="1280890"/>
+            <a:off x="1532751" y="160284"/>
+            <a:ext cx="8911687" cy="676053"/>
           </a:xfrm>
         </p:spPr>
         <p:txBody>
@@ -10893,14 +10790,33 @@
           <a:p>
             <a:r>
               <a:rPr lang="en-CA" dirty="0"/>
-              <a:t>Dynamic categories and sub categories</a:t>
-            </a:r>
+              <a:t>List of items in the same category</a:t>
+            </a:r>
+          </a:p>
+        </p:txBody>
+      </p:sp>
+      <p:sp>
+        <p:nvSpPr>
+          <p:cNvPr id="6" name="Content Placeholder 5"/>
+          <p:cNvSpPr>
+            <a:spLocks noGrp="1"/>
+          </p:cNvSpPr>
+          <p:nvPr>
+            <p:ph idx="1"/>
+          </p:nvPr>
+        </p:nvSpPr>
+        <p:spPr/>
+        <p:txBody>
+          <a:bodyPr/>
+          <a:lstStyle/>
+          <a:p>
+            <a:endParaRPr lang="en-CA" dirty="0"/>
           </a:p>
         </p:txBody>
       </p:sp>
       <p:pic>
         <p:nvPicPr>
-          <p:cNvPr id="8" name="Picture 7"/>
+          <p:cNvPr id="7" name="Picture 6"/>
           <p:cNvPicPr>
             <a:picLocks noChangeAspect="1"/>
           </p:cNvPicPr>
@@ -10914,72 +10830,117 @@
         </p:blipFill>
         <p:spPr>
           <a:xfrm>
-            <a:off x="1330256" y="1563756"/>
-            <a:ext cx="4610100" cy="2261360"/>
+            <a:off x="538431" y="1012549"/>
+            <a:ext cx="10582275" cy="4972050"/>
           </a:xfrm>
           <a:prstGeom prst="rect">
             <a:avLst/>
           </a:prstGeom>
         </p:spPr>
       </p:pic>
-      <p:pic>
-        <p:nvPicPr>
-          <p:cNvPr id="11" name="Picture 10"/>
-          <p:cNvPicPr>
-            <a:picLocks noChangeAspect="1"/>
-          </p:cNvPicPr>
+      <p:sp>
+        <p:nvSpPr>
+          <p:cNvPr id="8" name="Left Arrow 7"/>
+          <p:cNvSpPr/>
           <p:nvPr/>
-        </p:nvPicPr>
-        <p:blipFill>
-          <a:blip r:embed="rId3"/>
-          <a:stretch>
-            <a:fillRect/>
-          </a:stretch>
-        </p:blipFill>
+        </p:nvSpPr>
         <p:spPr>
           <a:xfrm>
-            <a:off x="6302340" y="1586741"/>
-            <a:ext cx="5067300" cy="2238375"/>
-          </a:xfrm>
-          <a:prstGeom prst="rect">
+            <a:off x="10875134" y="3498574"/>
+            <a:ext cx="1258956" cy="954155"/>
+          </a:xfrm>
+          <a:prstGeom prst="leftArrow">
             <a:avLst/>
           </a:prstGeom>
         </p:spPr>
-      </p:pic>
-      <p:pic>
-        <p:nvPicPr>
-          <p:cNvPr id="13" name="Picture 12"/>
-          <p:cNvPicPr>
-            <a:picLocks noChangeAspect="1"/>
-          </p:cNvPicPr>
+        <p:style>
+          <a:lnRef idx="2">
+            <a:schemeClr val="accent1">
+              <a:shade val="50000"/>
+            </a:schemeClr>
+          </a:lnRef>
+          <a:fillRef idx="1">
+            <a:schemeClr val="accent1"/>
+          </a:fillRef>
+          <a:effectRef idx="0">
+            <a:schemeClr val="accent1"/>
+          </a:effectRef>
+          <a:fontRef idx="minor">
+            <a:schemeClr val="lt1"/>
+          </a:fontRef>
+        </p:style>
+        <p:txBody>
+          <a:bodyPr rtlCol="0" anchor="ctr"/>
+          <a:lstStyle/>
+          <a:p>
+            <a:pPr algn="ctr"/>
+            <a:r>
+              <a:rPr lang="en-CA" dirty="0"/>
+              <a:t>Count Down</a:t>
+            </a:r>
+          </a:p>
+        </p:txBody>
+      </p:sp>
+      <p:sp>
+        <p:nvSpPr>
+          <p:cNvPr id="9" name="Down Arrow 8"/>
+          <p:cNvSpPr/>
           <p:nvPr/>
-        </p:nvPicPr>
-        <p:blipFill>
-          <a:blip r:embed="rId4"/>
-          <a:stretch>
-            <a:fillRect/>
-          </a:stretch>
-        </p:blipFill>
+        </p:nvSpPr>
         <p:spPr>
           <a:xfrm>
-            <a:off x="3421027" y="3962400"/>
-            <a:ext cx="5762625" cy="2637183"/>
-          </a:xfrm>
-          <a:prstGeom prst="rect">
+            <a:off x="6095999" y="2133600"/>
+            <a:ext cx="1325218" cy="1152939"/>
+          </a:xfrm>
+          <a:prstGeom prst="downArrow">
             <a:avLst/>
           </a:prstGeom>
         </p:spPr>
-      </p:pic>
+        <p:style>
+          <a:lnRef idx="2">
+            <a:schemeClr val="accent1">
+              <a:shade val="50000"/>
+            </a:schemeClr>
+          </a:lnRef>
+          <a:fillRef idx="1">
+            <a:schemeClr val="accent1"/>
+          </a:fillRef>
+          <a:effectRef idx="0">
+            <a:schemeClr val="accent1"/>
+          </a:effectRef>
+          <a:fontRef idx="minor">
+            <a:schemeClr val="lt1"/>
+          </a:fontRef>
+        </p:style>
+        <p:txBody>
+          <a:bodyPr rtlCol="0" anchor="ctr"/>
+          <a:lstStyle/>
+          <a:p>
+            <a:pPr algn="ctr"/>
+            <a:r>
+              <a:rPr lang="en-CA" dirty="0"/>
+              <a:t>Last bid</a:t>
+            </a:r>
+          </a:p>
+        </p:txBody>
+      </p:sp>
     </p:spTree>
     <p:extLst>
       <p:ext uri="{BB962C8B-B14F-4D97-AF65-F5344CB8AC3E}">
-        <p14:creationId xmlns:p14="http://schemas.microsoft.com/office/powerpoint/2010/main" val="2722291298"/>
+        <p14:creationId xmlns:p14="http://schemas.microsoft.com/office/powerpoint/2010/main" val="1122742657"/>
       </p:ext>
     </p:extLst>
   </p:cSld>
   <p:clrMapOvr>
     <a:masterClrMapping/>
   </p:clrMapOvr>
+  <p:timing>
+    <p:tnLst>
+      <p:par>
+        <p:cTn id="1" dur="indefinite" restart="never" nodeType="tmRoot"/>
+      </p:par>
+    </p:tnLst>
+  </p:timing>
 </p:sld>
 </file>
 
@@ -11010,49 +10971,27 @@
             <p:ph type="title"/>
           </p:nvPr>
         </p:nvSpPr>
-        <p:spPr>
-          <a:xfrm>
-            <a:off x="1532751" y="160284"/>
-            <a:ext cx="8911687" cy="676053"/>
-          </a:xfrm>
-        </p:spPr>
+        <p:spPr/>
         <p:txBody>
           <a:bodyPr/>
           <a:lstStyle/>
           <a:p>
             <a:r>
               <a:rPr lang="en-CA" dirty="0"/>
-              <a:t>List of items in the same category</a:t>
-            </a:r>
-          </a:p>
-        </p:txBody>
-      </p:sp>
-      <p:sp>
-        <p:nvSpPr>
-          <p:cNvPr id="6" name="Content Placeholder 5"/>
-          <p:cNvSpPr>
-            <a:spLocks noGrp="1"/>
-          </p:cNvSpPr>
-          <p:nvPr>
-            <p:ph idx="1"/>
-          </p:nvPr>
-        </p:nvSpPr>
-        <p:spPr/>
-        <p:txBody>
-          <a:bodyPr/>
-          <a:lstStyle/>
-          <a:p>
-            <a:endParaRPr lang="en-CA" dirty="0"/>
+              <a:t>Search item </a:t>
+            </a:r>
           </a:p>
         </p:txBody>
       </p:sp>
       <p:pic>
         <p:nvPicPr>
-          <p:cNvPr id="7" name="Picture 6"/>
+          <p:cNvPr id="4" name="Content Placeholder 3"/>
           <p:cNvPicPr>
-            <a:picLocks noChangeAspect="1"/>
+            <a:picLocks noGrp="1" noChangeAspect="1"/>
           </p:cNvPicPr>
-          <p:nvPr/>
+          <p:nvPr>
+            <p:ph idx="1"/>
+          </p:nvPr>
         </p:nvPicPr>
         <p:blipFill>
           <a:blip r:embed="rId2"/>
@@ -11062,26 +11001,50 @@
         </p:blipFill>
         <p:spPr>
           <a:xfrm>
-            <a:off x="538431" y="1012549"/>
-            <a:ext cx="10582275" cy="4972050"/>
+            <a:off x="984893" y="3451347"/>
+            <a:ext cx="10519719" cy="2666711"/>
           </a:xfrm>
           <a:prstGeom prst="rect">
             <a:avLst/>
           </a:prstGeom>
         </p:spPr>
       </p:pic>
-      <p:sp>
-        <p:nvSpPr>
-          <p:cNvPr id="8" name="Left Arrow 7"/>
+      <p:pic>
+        <p:nvPicPr>
+          <p:cNvPr id="6" name="Picture 5"/>
+          <p:cNvPicPr>
+            <a:picLocks noChangeAspect="1"/>
+          </p:cNvPicPr>
+          <p:nvPr/>
+        </p:nvPicPr>
+        <p:blipFill>
+          <a:blip r:embed="rId3"/>
+          <a:stretch>
+            <a:fillRect/>
+          </a:stretch>
+        </p:blipFill>
+        <p:spPr>
+          <a:xfrm>
+            <a:off x="1847849" y="1264555"/>
+            <a:ext cx="5811907" cy="1165575"/>
+          </a:xfrm>
+          <a:prstGeom prst="rect">
+            <a:avLst/>
+          </a:prstGeom>
+        </p:spPr>
+      </p:pic>
+      <p:sp>
+        <p:nvSpPr>
+          <p:cNvPr id="7" name="Notched Right Arrow 6"/>
           <p:cNvSpPr/>
           <p:nvPr/>
         </p:nvSpPr>
         <p:spPr>
-          <a:xfrm>
-            <a:off x="10875134" y="3498574"/>
-            <a:ext cx="1258956" cy="954155"/>
-          </a:xfrm>
-          <a:prstGeom prst="leftArrow">
+          <a:xfrm rot="19059318">
+            <a:off x="1659429" y="1938629"/>
+            <a:ext cx="1704243" cy="1092156"/>
+          </a:xfrm>
+          <a:prstGeom prst="notchedRightArrow">
             <a:avLst/>
           </a:prstGeom>
         </p:spPr>
@@ -11108,50 +11071,7 @@
             <a:pPr algn="ctr"/>
             <a:r>
               <a:rPr lang="en-CA" dirty="0"/>
-              <a:t>Count Down</a:t>
-            </a:r>
-          </a:p>
-        </p:txBody>
-      </p:sp>
-      <p:sp>
-        <p:nvSpPr>
-          <p:cNvPr id="9" name="Down Arrow 8"/>
-          <p:cNvSpPr/>
-          <p:nvPr/>
-        </p:nvSpPr>
-        <p:spPr>
-          <a:xfrm>
-            <a:off x="6095999" y="2133600"/>
-            <a:ext cx="1325218" cy="1152939"/>
-          </a:xfrm>
-          <a:prstGeom prst="downArrow">
-            <a:avLst/>
-          </a:prstGeom>
-        </p:spPr>
-        <p:style>
-          <a:lnRef idx="2">
-            <a:schemeClr val="accent1">
-              <a:shade val="50000"/>
-            </a:schemeClr>
-          </a:lnRef>
-          <a:fillRef idx="1">
-            <a:schemeClr val="accent1"/>
-          </a:fillRef>
-          <a:effectRef idx="0">
-            <a:schemeClr val="accent1"/>
-          </a:effectRef>
-          <a:fontRef idx="minor">
-            <a:schemeClr val="lt1"/>
-          </a:fontRef>
-        </p:style>
-        <p:txBody>
-          <a:bodyPr rtlCol="0" anchor="ctr"/>
-          <a:lstStyle/>
-          <a:p>
-            <a:pPr algn="ctr"/>
-            <a:r>
-              <a:rPr lang="en-CA" dirty="0"/>
-              <a:t>Last bid</a:t>
+              <a:t>Search text</a:t>
             </a:r>
           </a:p>
         </p:txBody>
@@ -11159,13 +11079,20 @@
     </p:spTree>
     <p:extLst>
       <p:ext uri="{BB962C8B-B14F-4D97-AF65-F5344CB8AC3E}">
-        <p14:creationId xmlns:p14="http://schemas.microsoft.com/office/powerpoint/2010/main" val="1122742657"/>
+        <p14:creationId xmlns:p14="http://schemas.microsoft.com/office/powerpoint/2010/main" val="2659307392"/>
       </p:ext>
     </p:extLst>
   </p:cSld>
   <p:clrMapOvr>
     <a:masterClrMapping/>
   </p:clrMapOvr>
+  <p:timing>
+    <p:tnLst>
+      <p:par>
+        <p:cTn id="1" dur="indefinite" restart="never" nodeType="tmRoot"/>
+      </p:par>
+    </p:tnLst>
+  </p:timing>
 </p:sld>
 </file>
 
@@ -11406,7 +11333,7 @@
   <a:extraClrSchemeLst/>
   <a:extLst>
     <a:ext uri="{05A4C25C-085E-4340-85A3-A5531E510DB2}">
-      <thm15:themeFamily xmlns:thm15="http://schemas.microsoft.com/office/thememl/2012/main" xmlns="" name="Wisp" id="{7CB32D59-10C0-40DD-B7BD-2E94284A981C}" vid="{24B1A44C-C006-48B2-A4D7-E5549B3D8CD4}"/>
+      <thm15:themeFamily xmlns:thm15="http://schemas.microsoft.com/office/thememl/2012/main" name="Wisp" id="{7CB32D59-10C0-40DD-B7BD-2E94284A981C}" vid="{24B1A44C-C006-48B2-A4D7-E5549B3D8CD4}"/>
     </a:ext>
   </a:extLst>
 </a:theme>

</xml_diff>